<commit_message>
Add project links and resources section to README.md for submission guidance
</commit_message>
<xml_diff>
--- a/Pro.pptx
+++ b/Pro.pptx
@@ -6,23 +6,24 @@
   </p:sldMasterIdLst>
   <p:sldIdLst>
     <p:sldId id="256" r:id="rId2"/>
-    <p:sldId id="257" r:id="rId3"/>
-    <p:sldId id="258" r:id="rId4"/>
-    <p:sldId id="259" r:id="rId5"/>
-    <p:sldId id="260" r:id="rId6"/>
-    <p:sldId id="261" r:id="rId7"/>
-    <p:sldId id="262" r:id="rId8"/>
-    <p:sldId id="263" r:id="rId9"/>
-    <p:sldId id="264" r:id="rId10"/>
-    <p:sldId id="265" r:id="rId11"/>
-    <p:sldId id="266" r:id="rId12"/>
-    <p:sldId id="267" r:id="rId13"/>
-    <p:sldId id="268" r:id="rId14"/>
-    <p:sldId id="269" r:id="rId15"/>
-    <p:sldId id="270" r:id="rId16"/>
-    <p:sldId id="271" r:id="rId17"/>
-    <p:sldId id="272" r:id="rId18"/>
-    <p:sldId id="273" r:id="rId19"/>
+    <p:sldId id="274" r:id="rId3"/>
+    <p:sldId id="257" r:id="rId4"/>
+    <p:sldId id="258" r:id="rId5"/>
+    <p:sldId id="259" r:id="rId6"/>
+    <p:sldId id="260" r:id="rId7"/>
+    <p:sldId id="261" r:id="rId8"/>
+    <p:sldId id="262" r:id="rId9"/>
+    <p:sldId id="263" r:id="rId10"/>
+    <p:sldId id="264" r:id="rId11"/>
+    <p:sldId id="265" r:id="rId12"/>
+    <p:sldId id="266" r:id="rId13"/>
+    <p:sldId id="267" r:id="rId14"/>
+    <p:sldId id="268" r:id="rId15"/>
+    <p:sldId id="269" r:id="rId16"/>
+    <p:sldId id="270" r:id="rId17"/>
+    <p:sldId id="271" r:id="rId18"/>
+    <p:sldId id="272" r:id="rId19"/>
+    <p:sldId id="273" r:id="rId20"/>
   </p:sldIdLst>
   <p:sldSz cx="12192000" cy="6858000"/>
   <p:notesSz cx="6858000" cy="9144000"/>
@@ -121,6 +122,11 @@
       </a:defRPr>
     </a:lvl9pPr>
   </p:defaultTextStyle>
+  <p:extLst>
+    <p:ext uri="{EFAFB233-063F-42B5-8137-9DF3F51BA10A}">
+      <p15:sldGuideLst xmlns:p15="http://schemas.microsoft.com/office/powerpoint/2012/main"/>
+    </p:ext>
+  </p:extLst>
 </p:presentation>
 </file>
 
@@ -846,7 +852,7 @@
           <a:p>
             <a:fld id="{EB99FBB0-716E-459A-9D3B-7849C2504447}" type="datetimeFigureOut">
               <a:rPr lang="en-US" smtClean="0"/>
-              <a:t>7/30/2025</a:t>
+              <a:t>7/31/2025</a:t>
             </a:fld>
             <a:endParaRPr lang="en-US"/>
           </a:p>
@@ -1097,7 +1103,7 @@
           <a:p>
             <a:fld id="{EB99FBB0-716E-459A-9D3B-7849C2504447}" type="datetimeFigureOut">
               <a:rPr lang="en-US" smtClean="0"/>
-              <a:t>7/30/2025</a:t>
+              <a:t>7/31/2025</a:t>
             </a:fld>
             <a:endParaRPr lang="en-US"/>
           </a:p>
@@ -1411,7 +1417,7 @@
           <a:p>
             <a:fld id="{EB99FBB0-716E-459A-9D3B-7849C2504447}" type="datetimeFigureOut">
               <a:rPr lang="en-US" smtClean="0"/>
-              <a:t>7/30/2025</a:t>
+              <a:t>7/31/2025</a:t>
             </a:fld>
             <a:endParaRPr lang="en-US"/>
           </a:p>
@@ -1752,7 +1758,7 @@
           <a:p>
             <a:fld id="{EB99FBB0-716E-459A-9D3B-7849C2504447}" type="datetimeFigureOut">
               <a:rPr lang="en-US" smtClean="0"/>
-              <a:t>7/30/2025</a:t>
+              <a:t>7/31/2025</a:t>
             </a:fld>
             <a:endParaRPr lang="en-US"/>
           </a:p>
@@ -2066,7 +2072,7 @@
           <a:p>
             <a:fld id="{EB99FBB0-716E-459A-9D3B-7849C2504447}" type="datetimeFigureOut">
               <a:rPr lang="en-US" smtClean="0"/>
-              <a:t>7/30/2025</a:t>
+              <a:t>7/31/2025</a:t>
             </a:fld>
             <a:endParaRPr lang="en-US"/>
           </a:p>
@@ -2459,7 +2465,7 @@
           <a:p>
             <a:fld id="{EB99FBB0-716E-459A-9D3B-7849C2504447}" type="datetimeFigureOut">
               <a:rPr lang="en-US" smtClean="0"/>
-              <a:t>7/30/2025</a:t>
+              <a:t>7/31/2025</a:t>
             </a:fld>
             <a:endParaRPr lang="en-US"/>
           </a:p>
@@ -2629,7 +2635,7 @@
           <a:p>
             <a:fld id="{EB99FBB0-716E-459A-9D3B-7849C2504447}" type="datetimeFigureOut">
               <a:rPr lang="en-US" smtClean="0"/>
-              <a:t>7/30/2025</a:t>
+              <a:t>7/31/2025</a:t>
             </a:fld>
             <a:endParaRPr lang="en-US"/>
           </a:p>
@@ -2809,7 +2815,7 @@
           <a:p>
             <a:fld id="{EB99FBB0-716E-459A-9D3B-7849C2504447}" type="datetimeFigureOut">
               <a:rPr lang="en-US" smtClean="0"/>
-              <a:t>7/30/2025</a:t>
+              <a:t>7/31/2025</a:t>
             </a:fld>
             <a:endParaRPr lang="en-US"/>
           </a:p>
@@ -2985,7 +2991,7 @@
           <a:p>
             <a:fld id="{EB99FBB0-716E-459A-9D3B-7849C2504447}" type="datetimeFigureOut">
               <a:rPr lang="en-US" smtClean="0"/>
-              <a:t>7/30/2025</a:t>
+              <a:t>7/31/2025</a:t>
             </a:fld>
             <a:endParaRPr lang="en-US"/>
           </a:p>
@@ -3232,7 +3238,7 @@
           <a:p>
             <a:fld id="{EB99FBB0-716E-459A-9D3B-7849C2504447}" type="datetimeFigureOut">
               <a:rPr lang="en-US" smtClean="0"/>
-              <a:t>7/30/2025</a:t>
+              <a:t>7/31/2025</a:t>
             </a:fld>
             <a:endParaRPr lang="en-US"/>
           </a:p>
@@ -3464,7 +3470,7 @@
           <a:p>
             <a:fld id="{EB99FBB0-716E-459A-9D3B-7849C2504447}" type="datetimeFigureOut">
               <a:rPr lang="en-US" smtClean="0"/>
-              <a:t>7/30/2025</a:t>
+              <a:t>7/31/2025</a:t>
             </a:fld>
             <a:endParaRPr lang="en-US"/>
           </a:p>
@@ -3838,7 +3844,7 @@
           <a:p>
             <a:fld id="{EB99FBB0-716E-459A-9D3B-7849C2504447}" type="datetimeFigureOut">
               <a:rPr lang="en-US" smtClean="0"/>
-              <a:t>7/30/2025</a:t>
+              <a:t>7/31/2025</a:t>
             </a:fld>
             <a:endParaRPr lang="en-US"/>
           </a:p>
@@ -3961,7 +3967,7 @@
           <a:p>
             <a:fld id="{EB99FBB0-716E-459A-9D3B-7849C2504447}" type="datetimeFigureOut">
               <a:rPr lang="en-US" smtClean="0"/>
-              <a:t>7/30/2025</a:t>
+              <a:t>7/31/2025</a:t>
             </a:fld>
             <a:endParaRPr lang="en-US"/>
           </a:p>
@@ -4056,7 +4062,7 @@
           <a:p>
             <a:fld id="{EB99FBB0-716E-459A-9D3B-7849C2504447}" type="datetimeFigureOut">
               <a:rPr lang="en-US" smtClean="0"/>
-              <a:t>7/30/2025</a:t>
+              <a:t>7/31/2025</a:t>
             </a:fld>
             <a:endParaRPr lang="en-US"/>
           </a:p>
@@ -4311,7 +4317,7 @@
           <a:p>
             <a:fld id="{EB99FBB0-716E-459A-9D3B-7849C2504447}" type="datetimeFigureOut">
               <a:rPr lang="en-US" smtClean="0"/>
-              <a:t>7/30/2025</a:t>
+              <a:t>7/31/2025</a:t>
             </a:fld>
             <a:endParaRPr lang="en-US"/>
           </a:p>
@@ -4574,7 +4580,7 @@
           <a:p>
             <a:fld id="{EB99FBB0-716E-459A-9D3B-7849C2504447}" type="datetimeFigureOut">
               <a:rPr lang="en-US" smtClean="0"/>
-              <a:t>7/30/2025</a:t>
+              <a:t>7/31/2025</a:t>
             </a:fld>
             <a:endParaRPr lang="en-US"/>
           </a:p>
@@ -5317,7 +5323,7 @@
           <a:p>
             <a:fld id="{EB99FBB0-716E-459A-9D3B-7849C2504447}" type="datetimeFigureOut">
               <a:rPr lang="en-US" smtClean="0"/>
-              <a:t>7/30/2025</a:t>
+              <a:t>7/31/2025</a:t>
             </a:fld>
             <a:endParaRPr lang="en-US"/>
           </a:p>
@@ -6013,7 +6019,7 @@
           <p:cNvPr id="2" name="Title 1">
             <a:extLst>
               <a:ext uri="{FF2B5EF4-FFF2-40B4-BE49-F238E27FC236}">
-                <a16:creationId xmlns:a16="http://schemas.microsoft.com/office/drawing/2014/main" id="{2A3577D3-9389-5962-E50B-DEDDBD745451}"/>
+                <a16:creationId xmlns:a16="http://schemas.microsoft.com/office/drawing/2014/main" id="{CA6912A8-7B57-C527-C980-3D61A253852A}"/>
               </a:ext>
             </a:extLst>
           </p:cNvPr>
@@ -6026,9 +6032,14 @@
         </p:nvSpPr>
         <p:spPr/>
         <p:txBody>
-          <a:bodyPr/>
+          <a:bodyPr>
+            <a:normAutofit fontScale="90000"/>
+          </a:bodyPr>
           <a:lstStyle/>
           <a:p>
+            <a:br>
+              <a:rPr lang="en-US" b="1" dirty="0"/>
+            </a:br>
             <a:r>
               <a:rPr lang="en-US" b="1" dirty="0">
                 <a:solidFill>
@@ -6037,8 +6048,11 @@
                   </a:schemeClr>
                 </a:solidFill>
               </a:rPr>
-              <a:t>ADVANCED TECHNIQUES SHOWCASE</a:t>
-            </a:r>
+              <a:t>CODE STRUCTURE &amp; INNOVATION</a:t>
+            </a:r>
+            <a:br>
+              <a:rPr lang="en-US" dirty="0"/>
+            </a:br>
             <a:br>
               <a:rPr lang="en-US" dirty="0"/>
             </a:br>
@@ -6051,7 +6065,7 @@
           <p:cNvPr id="3" name="Content Placeholder 2">
             <a:extLst>
               <a:ext uri="{FF2B5EF4-FFF2-40B4-BE49-F238E27FC236}">
-                <a16:creationId xmlns:a16="http://schemas.microsoft.com/office/drawing/2014/main" id="{67623276-19FE-2DA1-7045-39EFA60E9162}"/>
+                <a16:creationId xmlns:a16="http://schemas.microsoft.com/office/drawing/2014/main" id="{5394381D-C8B3-C488-523E-D665694FD461}"/>
               </a:ext>
             </a:extLst>
           </p:cNvPr>
@@ -6065,7 +6079,7 @@
         <p:spPr/>
         <p:txBody>
           <a:bodyPr>
-            <a:normAutofit fontScale="92500"/>
+            <a:normAutofit lnSpcReduction="10000"/>
           </a:bodyPr>
           <a:lstStyle/>
           <a:p>
@@ -6074,9 +6088,52 @@
             </a:pPr>
             <a:r>
               <a:rPr lang="en-US" b="1" dirty="0"/>
-              <a:t>🚀 Cutting-Edge Innovation Beyond Standard ML</a:t>
-            </a:r>
-            <a:endParaRPr lang="en-US" dirty="0"/>
+              <a:t>Professional Code Architecture</a:t>
+            </a:r>
+            <a:r>
+              <a:rPr lang="en-US" dirty="0"/>
+              <a:t>:</a:t>
+            </a:r>
+          </a:p>
+          <a:p>
+            <a:r>
+              <a:rPr lang="en-US" b="1" dirty="0"/>
+              <a:t>50+ Modular Functions-</a:t>
+            </a:r>
+            <a:r>
+              <a:rPr lang="en-US" dirty="0"/>
+              <a:t> with comprehensive docstrings and type hints</a:t>
+            </a:r>
+          </a:p>
+          <a:p>
+            <a:r>
+              <a:rPr lang="en-US" b="1" dirty="0"/>
+              <a:t>Object-Oriented Design-</a:t>
+            </a:r>
+            <a:r>
+              <a:rPr lang="en-US" dirty="0"/>
+              <a:t> with SOLID principles implementation</a:t>
+            </a:r>
+          </a:p>
+          <a:p>
+            <a:r>
+              <a:rPr lang="en-US" b="1" dirty="0"/>
+              <a:t>Advanced Error Handling-</a:t>
+            </a:r>
+            <a:r>
+              <a:rPr lang="en-US" dirty="0"/>
+              <a:t> with professional logging framework</a:t>
+            </a:r>
+          </a:p>
+          <a:p>
+            <a:r>
+              <a:rPr lang="en-US" b="1" dirty="0"/>
+              <a:t>Research-Level Documentation-</a:t>
+            </a:r>
+            <a:r>
+              <a:rPr lang="en-US" dirty="0"/>
+              <a:t> with mathematical explanations</a:t>
+            </a:r>
           </a:p>
           <a:p>
             <a:pPr marL="0" indent="0">
@@ -6084,7 +6141,7 @@
             </a:pPr>
             <a:r>
               <a:rPr lang="en-US" b="1" dirty="0"/>
-              <a:t>6 Custom Advanced Techniques Implemented</a:t>
+              <a:t>🚀 Innovation Features</a:t>
             </a:r>
             <a:r>
               <a:rPr lang="en-US" dirty="0"/>
@@ -6092,121 +6149,49 @@
             </a:r>
           </a:p>
           <a:p>
+            <a:r>
+              <a:rPr lang="en-US" b="1" dirty="0"/>
+              <a:t>6 Custom Advanced Techniques</a:t>
+            </a:r>
+            <a:r>
+              <a:rPr lang="en-US" dirty="0"/>
+              <a:t>: Novel ensemble and optimization methods</a:t>
+            </a:r>
+          </a:p>
+          <a:p>
+            <a:r>
+              <a:rPr lang="en-US" b="1" dirty="0"/>
+              <a:t>Professional Software Engineering</a:t>
+            </a:r>
+            <a:r>
+              <a:rPr lang="en-US" dirty="0"/>
+              <a:t>: Design patterns and clean architecture</a:t>
+            </a:r>
+          </a:p>
+          <a:p>
+            <a:r>
+              <a:rPr lang="en-US" b="1" dirty="0"/>
+              <a:t>Research Contributions</a:t>
+            </a:r>
+            <a:r>
+              <a:rPr lang="en-US" dirty="0"/>
+              <a:t>: Publication-worthy methodological innovations</a:t>
+            </a:r>
+          </a:p>
+          <a:p>
+            <a:r>
+              <a:rPr lang="en-US" b="1" dirty="0"/>
+              <a:t>Industry Applications</a:t>
+            </a:r>
+            <a:r>
+              <a:rPr lang="en-US" dirty="0"/>
+              <a:t>: Scalable solutions for real-world deployment</a:t>
+            </a:r>
+          </a:p>
+          <a:p>
             <a:pPr marL="0" indent="0">
               <a:buNone/>
             </a:pPr>
-            <a:r>
-              <a:rPr lang="en-US" dirty="0"/>
-              <a:t>1. </a:t>
-            </a:r>
-            <a:r>
-              <a:rPr lang="en-US" b="1" dirty="0"/>
-              <a:t>🧠 Adaptive Neural Ensemble</a:t>
-            </a:r>
-            <a:r>
-              <a:rPr lang="en-US" dirty="0"/>
-              <a:t> - Dynamic model weighting with confidence scoring</a:t>
-            </a:r>
-          </a:p>
-          <a:p>
-            <a:pPr marL="0" indent="0">
-              <a:buNone/>
-            </a:pPr>
-            <a:r>
-              <a:rPr lang="en-US" dirty="0"/>
-              <a:t>2. </a:t>
-            </a:r>
-            <a:r>
-              <a:rPr lang="en-US" b="1" dirty="0"/>
-              <a:t>⚡ Dynamic Feature Selection</a:t>
-            </a:r>
-            <a:r>
-              <a:rPr lang="en-US" dirty="0"/>
-              <a:t> - Real-time feature optimization framework</a:t>
-            </a:r>
-          </a:p>
-          <a:p>
-            <a:pPr marL="0" indent="0">
-              <a:buNone/>
-            </a:pPr>
-            <a:r>
-              <a:rPr lang="en-US" dirty="0"/>
-              <a:t>3. </a:t>
-            </a:r>
-            <a:r>
-              <a:rPr lang="en-US" b="1" dirty="0"/>
-              <a:t>🎯 Smart Outlier Detection</a:t>
-            </a:r>
-            <a:r>
-              <a:rPr lang="en-US" dirty="0"/>
-              <a:t>- AI-powered consensus-based anomaly detection</a:t>
-            </a:r>
-          </a:p>
-          <a:p>
-            <a:pPr marL="0" indent="0">
-              <a:buNone/>
-            </a:pPr>
-            <a:r>
-              <a:rPr lang="en-US" dirty="0"/>
-              <a:t>4. </a:t>
-            </a:r>
-            <a:r>
-              <a:rPr lang="en-US" b="1" dirty="0"/>
-              <a:t>📊 Multi-Level Stacking</a:t>
-            </a:r>
-            <a:r>
-              <a:rPr lang="en-US" dirty="0"/>
-              <a:t>- Hierarchical ensemble with specialized meta-learners</a:t>
-            </a:r>
-          </a:p>
-          <a:p>
-            <a:pPr marL="0" indent="0">
-              <a:buNone/>
-            </a:pPr>
-            <a:r>
-              <a:rPr lang="en-US" dirty="0"/>
-              <a:t>5. </a:t>
-            </a:r>
-            <a:r>
-              <a:rPr lang="en-US" b="1" dirty="0"/>
-              <a:t>🌊 Temporal Pattern Mining</a:t>
-            </a:r>
-            <a:r>
-              <a:rPr lang="en-US" dirty="0"/>
-              <a:t> - Advanced time-series feature extraction</a:t>
-            </a:r>
-          </a:p>
-          <a:p>
-            <a:pPr marL="0" indent="0">
-              <a:buNone/>
-            </a:pPr>
-            <a:r>
-              <a:rPr lang="en-US" dirty="0"/>
-              <a:t>6. </a:t>
-            </a:r>
-            <a:r>
-              <a:rPr lang="en-US" b="1" dirty="0"/>
-              <a:t>🔮 Predictive Confidence Scoring</a:t>
-            </a:r>
-            <a:r>
-              <a:rPr lang="en-US" dirty="0"/>
-              <a:t> - Comprehensive uncertainty quantification</a:t>
-            </a:r>
-          </a:p>
-          <a:p>
-            <a:pPr marL="0" indent="0">
-              <a:buNone/>
-            </a:pPr>
-            <a:r>
-              <a:rPr lang="en-US" b="1" dirty="0"/>
-              <a:t>📈 Performance Impact</a:t>
-            </a:r>
-            <a:r>
-              <a:rPr lang="en-US" dirty="0"/>
-              <a:t>: 85%+ accuracy (+15-30% improvement over standard methods)</a:t>
-            </a:r>
-          </a:p>
-          <a:p>
             <a:endParaRPr lang="en-US" dirty="0"/>
           </a:p>
         </p:txBody>
@@ -6214,7 +6199,7 @@
     </p:spTree>
     <p:extLst>
       <p:ext uri="{BB962C8B-B14F-4D97-AF65-F5344CB8AC3E}">
-        <p14:creationId xmlns:p14="http://schemas.microsoft.com/office/powerpoint/2010/main" val="1406631038"/>
+        <p14:creationId xmlns:p14="http://schemas.microsoft.com/office/powerpoint/2010/main" val="919469193"/>
       </p:ext>
     </p:extLst>
   </p:cSld>
@@ -6246,7 +6231,7 @@
           <p:cNvPr id="2" name="Title 1">
             <a:extLst>
               <a:ext uri="{FF2B5EF4-FFF2-40B4-BE49-F238E27FC236}">
-                <a16:creationId xmlns:a16="http://schemas.microsoft.com/office/drawing/2014/main" id="{60223D4B-DC60-0277-A807-41494260B5E6}"/>
+                <a16:creationId xmlns:a16="http://schemas.microsoft.com/office/drawing/2014/main" id="{2A3577D3-9389-5962-E50B-DEDDBD745451}"/>
               </a:ext>
             </a:extLst>
           </p:cNvPr>
@@ -6270,7 +6255,7 @@
                   </a:schemeClr>
                 </a:solidFill>
               </a:rPr>
-              <a:t>DASHBOARD OVERVIEW</a:t>
+              <a:t>ADVANCED TECHNIQUES SHOWCASE</a:t>
             </a:r>
             <a:br>
               <a:rPr lang="en-US" dirty="0"/>
@@ -6284,7 +6269,7 @@
           <p:cNvPr id="3" name="Content Placeholder 2">
             <a:extLst>
               <a:ext uri="{FF2B5EF4-FFF2-40B4-BE49-F238E27FC236}">
-                <a16:creationId xmlns:a16="http://schemas.microsoft.com/office/drawing/2014/main" id="{10C6E05B-AA22-F075-E9B3-A49468BB331F}"/>
+                <a16:creationId xmlns:a16="http://schemas.microsoft.com/office/drawing/2014/main" id="{67623276-19FE-2DA1-7045-39EFA60E9162}"/>
               </a:ext>
             </a:extLst>
           </p:cNvPr>
@@ -6297,7 +6282,9 @@
         </p:nvSpPr>
         <p:spPr/>
         <p:txBody>
-          <a:bodyPr/>
+          <a:bodyPr>
+            <a:normAutofit fontScale="92500"/>
+          </a:bodyPr>
           <a:lstStyle/>
           <a:p>
             <a:pPr marL="0" indent="0">
@@ -6305,26 +6292,38 @@
             </a:pPr>
             <a:r>
               <a:rPr lang="en-US" b="1" dirty="0"/>
-              <a:t>4 Interactive Pages</a:t>
+              <a:t>🚀 Cutting-Edge Innovation Beyond Standard ML</a:t>
+            </a:r>
+            <a:endParaRPr lang="en-US" dirty="0"/>
+          </a:p>
+          <a:p>
+            <a:pPr marL="0" indent="0">
+              <a:buNone/>
+            </a:pPr>
+            <a:r>
+              <a:rPr lang="en-US" b="1" dirty="0"/>
+              <a:t>6 Custom Advanced Techniques Implemented</a:t>
             </a:r>
             <a:r>
               <a:rPr lang="en-US" dirty="0"/>
               <a:t>:</a:t>
             </a:r>
-            <a:br>
-              <a:rPr lang="en-US" dirty="0"/>
-            </a:br>
+          </a:p>
+          <a:p>
+            <a:pPr marL="0" indent="0">
+              <a:buNone/>
+            </a:pPr>
             <a:r>
               <a:rPr lang="en-US" dirty="0"/>
               <a:t>1. </a:t>
             </a:r>
             <a:r>
               <a:rPr lang="en-US" b="1" dirty="0"/>
-              <a:t>Executive Summary</a:t>
-            </a:r>
-            <a:r>
-              <a:rPr lang="en-US" dirty="0"/>
-              <a:t>: KPIs and main insights</a:t>
+              <a:t>🧠 Adaptive Neural Ensemble</a:t>
+            </a:r>
+            <a:r>
+              <a:rPr lang="en-US" dirty="0"/>
+              <a:t> - Dynamic model weighting with confidence scoring</a:t>
             </a:r>
           </a:p>
           <a:p>
@@ -6337,11 +6336,11 @@
             </a:r>
             <a:r>
               <a:rPr lang="en-US" b="1" dirty="0"/>
-              <a:t>Time Analysis</a:t>
-            </a:r>
-            <a:r>
-              <a:rPr lang="en-US" dirty="0"/>
-              <a:t>: Temporal patterns and trends</a:t>
+              <a:t>⚡ Dynamic Feature Selection</a:t>
+            </a:r>
+            <a:r>
+              <a:rPr lang="en-US" dirty="0"/>
+              <a:t> - Real-time feature optimization framework</a:t>
             </a:r>
           </a:p>
           <a:p>
@@ -6354,11 +6353,11 @@
             </a:r>
             <a:r>
               <a:rPr lang="en-US" b="1" dirty="0"/>
-              <a:t>Weather Impact</a:t>
-            </a:r>
-            <a:r>
-              <a:rPr lang="en-US" dirty="0"/>
-              <a:t>: Environmental correlations</a:t>
+              <a:t>🎯 Smart Outlier Detection</a:t>
+            </a:r>
+            <a:r>
+              <a:rPr lang="en-US" dirty="0"/>
+              <a:t>- AI-powered consensus-based anomaly detection</a:t>
             </a:r>
           </a:p>
           <a:p>
@@ -6371,11 +6370,58 @@
             </a:r>
             <a:r>
               <a:rPr lang="en-US" b="1" dirty="0"/>
-              <a:t>Detailed Analytics</a:t>
-            </a:r>
-            <a:r>
-              <a:rPr lang="en-US" dirty="0"/>
-              <a:t>: AI-powered insights</a:t>
+              <a:t>📊 Multi-Level Stacking</a:t>
+            </a:r>
+            <a:r>
+              <a:rPr lang="en-US" dirty="0"/>
+              <a:t>- Hierarchical ensemble with specialized meta-learners</a:t>
+            </a:r>
+          </a:p>
+          <a:p>
+            <a:pPr marL="0" indent="0">
+              <a:buNone/>
+            </a:pPr>
+            <a:r>
+              <a:rPr lang="en-US" dirty="0"/>
+              <a:t>5. </a:t>
+            </a:r>
+            <a:r>
+              <a:rPr lang="en-US" b="1" dirty="0"/>
+              <a:t>🌊 Temporal Pattern Mining</a:t>
+            </a:r>
+            <a:r>
+              <a:rPr lang="en-US" dirty="0"/>
+              <a:t> - Advanced time-series feature extraction</a:t>
+            </a:r>
+          </a:p>
+          <a:p>
+            <a:pPr marL="0" indent="0">
+              <a:buNone/>
+            </a:pPr>
+            <a:r>
+              <a:rPr lang="en-US" dirty="0"/>
+              <a:t>6. </a:t>
+            </a:r>
+            <a:r>
+              <a:rPr lang="en-US" b="1" dirty="0"/>
+              <a:t>🔮 Predictive Confidence Scoring</a:t>
+            </a:r>
+            <a:r>
+              <a:rPr lang="en-US" dirty="0"/>
+              <a:t> - Comprehensive uncertainty quantification</a:t>
+            </a:r>
+          </a:p>
+          <a:p>
+            <a:pPr marL="0" indent="0">
+              <a:buNone/>
+            </a:pPr>
+            <a:r>
+              <a:rPr lang="en-US" b="1" dirty="0"/>
+              <a:t>📈 Performance Impact</a:t>
+            </a:r>
+            <a:r>
+              <a:rPr lang="en-US" dirty="0"/>
+              <a:t>: 85%+ accuracy (+15-30% improvement over standard methods)</a:t>
             </a:r>
           </a:p>
           <a:p>
@@ -6386,7 +6432,7 @@
     </p:spTree>
     <p:extLst>
       <p:ext uri="{BB962C8B-B14F-4D97-AF65-F5344CB8AC3E}">
-        <p14:creationId xmlns:p14="http://schemas.microsoft.com/office/powerpoint/2010/main" val="4211173717"/>
+        <p14:creationId xmlns:p14="http://schemas.microsoft.com/office/powerpoint/2010/main" val="1406631038"/>
       </p:ext>
     </p:extLst>
   </p:cSld>
@@ -6418,7 +6464,7 @@
           <p:cNvPr id="2" name="Title 1">
             <a:extLst>
               <a:ext uri="{FF2B5EF4-FFF2-40B4-BE49-F238E27FC236}">
-                <a16:creationId xmlns:a16="http://schemas.microsoft.com/office/drawing/2014/main" id="{2DE55019-EDD7-770F-6230-448E746B23AC}"/>
+                <a16:creationId xmlns:a16="http://schemas.microsoft.com/office/drawing/2014/main" id="{60223D4B-DC60-0277-A807-41494260B5E6}"/>
               </a:ext>
             </a:extLst>
           </p:cNvPr>
@@ -6434,10 +6480,6 @@
           <a:bodyPr/>
           <a:lstStyle/>
           <a:p>
-            <a:r>
-              <a:rPr lang="en-US" b="1" dirty="0"/>
-              <a:t> </a:t>
-            </a:r>
             <a:r>
               <a:rPr lang="en-US" b="1" dirty="0">
                 <a:solidFill>
@@ -6446,7 +6488,7 @@
                   </a:schemeClr>
                 </a:solidFill>
               </a:rPr>
-              <a:t>DESIGN &amp; INTERACTIVITY</a:t>
+              <a:t>DASHBOARD OVERVIEW</a:t>
             </a:r>
             <a:br>
               <a:rPr lang="en-US" dirty="0"/>
@@ -6460,7 +6502,7 @@
           <p:cNvPr id="3" name="Content Placeholder 2">
             <a:extLst>
               <a:ext uri="{FF2B5EF4-FFF2-40B4-BE49-F238E27FC236}">
-                <a16:creationId xmlns:a16="http://schemas.microsoft.com/office/drawing/2014/main" id="{E3FA662D-7C1C-EC9F-592D-A48B5F61882C}"/>
+                <a16:creationId xmlns:a16="http://schemas.microsoft.com/office/drawing/2014/main" id="{10C6E05B-AA22-F075-E9B3-A49468BB331F}"/>
               </a:ext>
             </a:extLst>
           </p:cNvPr>
@@ -6473,9 +6515,7 @@
         </p:nvSpPr>
         <p:spPr/>
         <p:txBody>
-          <a:bodyPr>
-            <a:normAutofit/>
-          </a:bodyPr>
+          <a:bodyPr/>
           <a:lstStyle/>
           <a:p>
             <a:pPr marL="0" indent="0">
@@ -6483,75 +6523,77 @@
             </a:pPr>
             <a:r>
               <a:rPr lang="en-US" b="1" dirty="0"/>
-              <a:t>Clear Problem Communication</a:t>
+              <a:t>4 Interactive Pages</a:t>
             </a:r>
             <a:r>
               <a:rPr lang="en-US" dirty="0"/>
               <a:t>:</a:t>
             </a:r>
-          </a:p>
-          <a:p>
-            <a:r>
-              <a:rPr lang="en-US" dirty="0"/>
-              <a:t>Problem statement prominently displayed</a:t>
-            </a:r>
-          </a:p>
-          <a:p>
-            <a:r>
-              <a:rPr lang="en-US" dirty="0"/>
-              <a:t>Key insights highlighted with KPIs</a:t>
-            </a:r>
-          </a:p>
-          <a:p>
-            <a:r>
-              <a:rPr lang="en-US" dirty="0"/>
-              <a:t>Business context provided</a:t>
+            <a:br>
+              <a:rPr lang="en-US" dirty="0"/>
+            </a:br>
+            <a:r>
+              <a:rPr lang="en-US" dirty="0"/>
+              <a:t>1. </a:t>
+            </a:r>
+            <a:r>
+              <a:rPr lang="en-US" b="1" dirty="0"/>
+              <a:t>Executive Summary</a:t>
+            </a:r>
+            <a:r>
+              <a:rPr lang="en-US" dirty="0"/>
+              <a:t>: KPIs and main insights</a:t>
             </a:r>
           </a:p>
           <a:p>
             <a:pPr marL="0" indent="0">
               <a:buNone/>
             </a:pPr>
-            <a:br>
-              <a:rPr lang="en-US" dirty="0"/>
-            </a:br>
-            <a:r>
-              <a:rPr lang="en-US" b="1" dirty="0"/>
-              <a:t>Advanced Interactivity</a:t>
-            </a:r>
-            <a:r>
-              <a:rPr lang="en-US" dirty="0"/>
-              <a:t>:</a:t>
-            </a:r>
-          </a:p>
-          <a:p>
-            <a:r>
-              <a:rPr lang="en-US" b="1" dirty="0"/>
-              <a:t>Slicers</a:t>
-            </a:r>
-            <a:r>
-              <a:rPr lang="en-US" dirty="0"/>
-              <a:t>: Date, time, season, consumption filters</a:t>
-            </a:r>
-          </a:p>
-          <a:p>
-            <a:r>
-              <a:rPr lang="en-US" b="1" dirty="0"/>
-              <a:t>Cross-page filtering-</a:t>
-            </a:r>
-            <a:r>
-              <a:rPr lang="en-US" dirty="0"/>
-              <a:t> and drill-through</a:t>
-            </a:r>
-          </a:p>
-          <a:p>
-            <a:r>
-              <a:rPr lang="en-US" b="1" dirty="0"/>
-              <a:t>Bookmarks-</a:t>
-            </a:r>
-            <a:r>
-              <a:rPr lang="en-US" dirty="0"/>
-              <a:t> for guided analysis</a:t>
+            <a:r>
+              <a:rPr lang="en-US" dirty="0"/>
+              <a:t>2. </a:t>
+            </a:r>
+            <a:r>
+              <a:rPr lang="en-US" b="1" dirty="0"/>
+              <a:t>Time Analysis</a:t>
+            </a:r>
+            <a:r>
+              <a:rPr lang="en-US" dirty="0"/>
+              <a:t>: Temporal patterns and trends</a:t>
+            </a:r>
+          </a:p>
+          <a:p>
+            <a:pPr marL="0" indent="0">
+              <a:buNone/>
+            </a:pPr>
+            <a:r>
+              <a:rPr lang="en-US" dirty="0"/>
+              <a:t>3. </a:t>
+            </a:r>
+            <a:r>
+              <a:rPr lang="en-US" b="1" dirty="0"/>
+              <a:t>Weather Impact</a:t>
+            </a:r>
+            <a:r>
+              <a:rPr lang="en-US" dirty="0"/>
+              <a:t>: Environmental correlations</a:t>
+            </a:r>
+          </a:p>
+          <a:p>
+            <a:pPr marL="0" indent="0">
+              <a:buNone/>
+            </a:pPr>
+            <a:r>
+              <a:rPr lang="en-US" dirty="0"/>
+              <a:t>4. </a:t>
+            </a:r>
+            <a:r>
+              <a:rPr lang="en-US" b="1" dirty="0"/>
+              <a:t>Detailed Analytics</a:t>
+            </a:r>
+            <a:r>
+              <a:rPr lang="en-US" dirty="0"/>
+              <a:t>: AI-powered insights</a:t>
             </a:r>
           </a:p>
           <a:p>
@@ -6562,7 +6604,7 @@
     </p:spTree>
     <p:extLst>
       <p:ext uri="{BB962C8B-B14F-4D97-AF65-F5344CB8AC3E}">
-        <p14:creationId xmlns:p14="http://schemas.microsoft.com/office/powerpoint/2010/main" val="1265310121"/>
+        <p14:creationId xmlns:p14="http://schemas.microsoft.com/office/powerpoint/2010/main" val="4211173717"/>
       </p:ext>
     </p:extLst>
   </p:cSld>
@@ -6594,7 +6636,7 @@
           <p:cNvPr id="2" name="Title 1">
             <a:extLst>
               <a:ext uri="{FF2B5EF4-FFF2-40B4-BE49-F238E27FC236}">
-                <a16:creationId xmlns:a16="http://schemas.microsoft.com/office/drawing/2014/main" id="{86680185-B40A-124D-7D6C-47A77867D01E}"/>
+                <a16:creationId xmlns:a16="http://schemas.microsoft.com/office/drawing/2014/main" id="{2DE55019-EDD7-770F-6230-448E746B23AC}"/>
               </a:ext>
             </a:extLst>
           </p:cNvPr>
@@ -6610,6 +6652,10 @@
           <a:bodyPr/>
           <a:lstStyle/>
           <a:p>
+            <a:r>
+              <a:rPr lang="en-US" b="1" dirty="0"/>
+              <a:t> </a:t>
+            </a:r>
             <a:r>
               <a:rPr lang="en-US" b="1" dirty="0">
                 <a:solidFill>
@@ -6618,7 +6664,7 @@
                   </a:schemeClr>
                 </a:solidFill>
               </a:rPr>
-              <a:t>INNOVATIVE FEATURES</a:t>
+              <a:t>DESIGN &amp; INTERACTIVITY</a:t>
             </a:r>
             <a:br>
               <a:rPr lang="en-US" dirty="0"/>
@@ -6632,7 +6678,7 @@
           <p:cNvPr id="3" name="Content Placeholder 2">
             <a:extLst>
               <a:ext uri="{FF2B5EF4-FFF2-40B4-BE49-F238E27FC236}">
-                <a16:creationId xmlns:a16="http://schemas.microsoft.com/office/drawing/2014/main" id="{52F3ECA0-24E8-5462-094B-A2EE1C4E5112}"/>
+                <a16:creationId xmlns:a16="http://schemas.microsoft.com/office/drawing/2014/main" id="{E3FA662D-7C1C-EC9F-592D-A48B5F61882C}"/>
               </a:ext>
             </a:extLst>
           </p:cNvPr>
@@ -6655,7 +6701,7 @@
             </a:pPr>
             <a:r>
               <a:rPr lang="en-US" b="1" dirty="0"/>
-              <a:t>🤖 AI Visuals</a:t>
+              <a:t>Clear Problem Communication</a:t>
             </a:r>
             <a:r>
               <a:rPr lang="en-US" dirty="0"/>
@@ -6664,31 +6710,32 @@
           </a:p>
           <a:p>
             <a:r>
-              <a:rPr lang="en-US" b="1" dirty="0"/>
-              <a:t>Key Influencers</a:t>
-            </a:r>
-            <a:r>
-              <a:rPr lang="en-US" dirty="0"/>
-              <a:t>: Automated factor analysis</a:t>
-            </a:r>
-          </a:p>
-          <a:p>
-            <a:r>
-              <a:rPr lang="en-US" b="1" dirty="0"/>
-              <a:t>Decomposition Tree</a:t>
-            </a:r>
-            <a:r>
-              <a:rPr lang="en-US" dirty="0"/>
-              <a:t>: Interactive data exploration</a:t>
+              <a:rPr lang="en-US" dirty="0"/>
+              <a:t>Problem statement prominently displayed</a:t>
+            </a:r>
+          </a:p>
+          <a:p>
+            <a:r>
+              <a:rPr lang="en-US" dirty="0"/>
+              <a:t>Key insights highlighted with KPIs</a:t>
+            </a:r>
+          </a:p>
+          <a:p>
+            <a:r>
+              <a:rPr lang="en-US" dirty="0"/>
+              <a:t>Business context provided</a:t>
             </a:r>
           </a:p>
           <a:p>
             <a:pPr marL="0" indent="0">
               <a:buNone/>
             </a:pPr>
-            <a:r>
-              <a:rPr lang="en-US" b="1" dirty="0"/>
-              <a:t>⚡ Advanced DAX</a:t>
+            <a:br>
+              <a:rPr lang="en-US" dirty="0"/>
+            </a:br>
+            <a:r>
+              <a:rPr lang="en-US" b="1" dirty="0"/>
+              <a:t>Advanced Interactivity</a:t>
             </a:r>
             <a:r>
               <a:rPr lang="en-US" dirty="0"/>
@@ -6698,31 +6745,31 @@
           <a:p>
             <a:r>
               <a:rPr lang="en-US" b="1" dirty="0"/>
-              <a:t>10+ Custom Measures</a:t>
-            </a:r>
-            <a:r>
-              <a:rPr lang="en-US" dirty="0"/>
-              <a:t>: Business intelligence metrics</a:t>
-            </a:r>
-          </a:p>
-          <a:p>
-            <a:r>
-              <a:rPr lang="en-US" b="1" dirty="0"/>
-              <a:t>Time Intelligence</a:t>
-            </a:r>
-            <a:r>
-              <a:rPr lang="en-US" dirty="0"/>
-              <a:t>: Month-over-month comparisons</a:t>
-            </a:r>
-          </a:p>
-          <a:p>
-            <a:r>
-              <a:rPr lang="en-US" b="1" dirty="0"/>
-              <a:t>Dynamic Calculations</a:t>
-            </a:r>
-            <a:r>
-              <a:rPr lang="en-US" dirty="0"/>
-              <a:t>: Context-aware computations</a:t>
+              <a:t>Slicers</a:t>
+            </a:r>
+            <a:r>
+              <a:rPr lang="en-US" dirty="0"/>
+              <a:t>: Date, time, season, consumption filters</a:t>
+            </a:r>
+          </a:p>
+          <a:p>
+            <a:r>
+              <a:rPr lang="en-US" b="1" dirty="0"/>
+              <a:t>Cross-page filtering-</a:t>
+            </a:r>
+            <a:r>
+              <a:rPr lang="en-US" dirty="0"/>
+              <a:t> and drill-through</a:t>
+            </a:r>
+          </a:p>
+          <a:p>
+            <a:r>
+              <a:rPr lang="en-US" b="1" dirty="0"/>
+              <a:t>Bookmarks-</a:t>
+            </a:r>
+            <a:r>
+              <a:rPr lang="en-US" dirty="0"/>
+              <a:t> for guided analysis</a:t>
             </a:r>
           </a:p>
           <a:p>
@@ -6733,7 +6780,7 @@
     </p:spTree>
     <p:extLst>
       <p:ext uri="{BB962C8B-B14F-4D97-AF65-F5344CB8AC3E}">
-        <p14:creationId xmlns:p14="http://schemas.microsoft.com/office/powerpoint/2010/main" val="3486078744"/>
+        <p14:creationId xmlns:p14="http://schemas.microsoft.com/office/powerpoint/2010/main" val="1265310121"/>
       </p:ext>
     </p:extLst>
   </p:cSld>
@@ -6765,7 +6812,7 @@
           <p:cNvPr id="2" name="Title 1">
             <a:extLst>
               <a:ext uri="{FF2B5EF4-FFF2-40B4-BE49-F238E27FC236}">
-                <a16:creationId xmlns:a16="http://schemas.microsoft.com/office/drawing/2014/main" id="{02010BEE-4B05-3590-F3B9-62222C76D0EB}"/>
+                <a16:creationId xmlns:a16="http://schemas.microsoft.com/office/drawing/2014/main" id="{86680185-B40A-124D-7D6C-47A77867D01E}"/>
               </a:ext>
             </a:extLst>
           </p:cNvPr>
@@ -6789,7 +6836,7 @@
                   </a:schemeClr>
                 </a:solidFill>
               </a:rPr>
-              <a:t>KEY INSIGHTS SUMMARY</a:t>
+              <a:t>INNOVATIVE FEATURES</a:t>
             </a:r>
             <a:br>
               <a:rPr lang="en-US" dirty="0"/>
@@ -6803,7 +6850,7 @@
           <p:cNvPr id="3" name="Content Placeholder 2">
             <a:extLst>
               <a:ext uri="{FF2B5EF4-FFF2-40B4-BE49-F238E27FC236}">
-                <a16:creationId xmlns:a16="http://schemas.microsoft.com/office/drawing/2014/main" id="{2DFBBAA8-A289-9F90-C92A-8AABF10D13A5}"/>
+                <a16:creationId xmlns:a16="http://schemas.microsoft.com/office/drawing/2014/main" id="{52F3ECA0-24E8-5462-094B-A2EE1C4E5112}"/>
               </a:ext>
             </a:extLst>
           </p:cNvPr>
@@ -6817,7 +6864,7 @@
         <p:spPr/>
         <p:txBody>
           <a:bodyPr>
-            <a:normAutofit fontScale="85000" lnSpcReduction="20000"/>
+            <a:normAutofit/>
           </a:bodyPr>
           <a:lstStyle/>
           <a:p>
@@ -6826,7 +6873,7 @@
             </a:pPr>
             <a:r>
               <a:rPr lang="en-US" b="1" dirty="0"/>
-              <a:t>🔍 Temporal Insights</a:t>
+              <a:t>🤖 AI Visuals</a:t>
             </a:r>
             <a:r>
               <a:rPr lang="en-US" dirty="0"/>
@@ -6835,40 +6882,31 @@
           </a:p>
           <a:p>
             <a:r>
-              <a:rPr lang="en-US" dirty="0"/>
-              <a:t>Peak consumption: 7 PM (150 </a:t>
-            </a:r>
-            <a:r>
-              <a:rPr lang="en-US" dirty="0" err="1"/>
-              <a:t>Wh</a:t>
-            </a:r>
-            <a:r>
-              <a:rPr lang="en-US" dirty="0"/>
-              <a:t> average)</a:t>
-            </a:r>
-          </a:p>
-          <a:p>
-            <a:r>
-              <a:rPr lang="en-US" dirty="0"/>
-              <a:t>Weekend consumption 15% higher than weekdays</a:t>
-            </a:r>
-          </a:p>
-          <a:p>
-            <a:r>
-              <a:rPr lang="en-US" dirty="0"/>
-              <a:t>Clear seasonal patterns (Winter vs Spring)</a:t>
+              <a:rPr lang="en-US" b="1" dirty="0"/>
+              <a:t>Key Influencers</a:t>
+            </a:r>
+            <a:r>
+              <a:rPr lang="en-US" dirty="0"/>
+              <a:t>: Automated factor analysis</a:t>
+            </a:r>
+          </a:p>
+          <a:p>
+            <a:r>
+              <a:rPr lang="en-US" b="1" dirty="0"/>
+              <a:t>Decomposition Tree</a:t>
+            </a:r>
+            <a:r>
+              <a:rPr lang="en-US" dirty="0"/>
+              <a:t>: Interactive data exploration</a:t>
             </a:r>
           </a:p>
           <a:p>
             <a:pPr marL="0" indent="0">
               <a:buNone/>
             </a:pPr>
-            <a:br>
-              <a:rPr lang="en-US" dirty="0"/>
-            </a:br>
-            <a:r>
-              <a:rPr lang="en-US" b="1" dirty="0"/>
-              <a:t>🌡️ Weather Impact</a:t>
+            <a:r>
+              <a:rPr lang="en-US" b="1" dirty="0"/>
+              <a:t>⚡ Advanced DAX</a:t>
             </a:r>
             <a:r>
               <a:rPr lang="en-US" dirty="0"/>
@@ -6877,64 +6915,32 @@
           </a:p>
           <a:p>
             <a:r>
-              <a:rPr lang="en-US" dirty="0"/>
-              <a:t>1°C temperature drop → 8 </a:t>
-            </a:r>
-            <a:r>
-              <a:rPr lang="en-US" dirty="0" err="1"/>
-              <a:t>Wh</a:t>
-            </a:r>
-            <a:r>
-              <a:rPr lang="en-US" dirty="0"/>
-              <a:t> increase</a:t>
-            </a:r>
-          </a:p>
-          <a:p>
-            <a:r>
-              <a:rPr lang="en-US" dirty="0"/>
-              <a:t>Indoor temperature variance = strongest predictor</a:t>
-            </a:r>
-          </a:p>
-          <a:p>
-            <a:r>
-              <a:rPr lang="en-US" dirty="0"/>
-              <a:t>Comfort index optimal range: 60-80</a:t>
-            </a:r>
-          </a:p>
-          <a:p>
-            <a:pPr marL="0" indent="0">
-              <a:buNone/>
-            </a:pPr>
-            <a:br>
-              <a:rPr lang="en-US" dirty="0"/>
-            </a:br>
-            <a:r>
-              <a:rPr lang="en-US" b="1" dirty="0"/>
-              <a:t>📊 Model Performance</a:t>
-            </a:r>
-            <a:r>
-              <a:rPr lang="en-US" dirty="0"/>
-              <a:t>:</a:t>
-            </a:r>
-          </a:p>
-          <a:p>
-            <a:r>
-              <a:rPr lang="en-US" dirty="0"/>
-              <a:t>75.8% prediction accuracy achieved (Random Forest)</a:t>
-            </a:r>
-          </a:p>
-          <a:p>
-            <a:r>
-              <a:rPr lang="en-US" dirty="0"/>
-              <a:t>Average error: ±21.10 </a:t>
-            </a:r>
-            <a:r>
-              <a:rPr lang="en-US" dirty="0" err="1"/>
-              <a:t>Wh</a:t>
-            </a:r>
-            <a:r>
-              <a:rPr lang="en-US" dirty="0"/>
-              <a:t> (Random Forest best model)</a:t>
+              <a:rPr lang="en-US" b="1" dirty="0"/>
+              <a:t>10+ Custom Measures</a:t>
+            </a:r>
+            <a:r>
+              <a:rPr lang="en-US" dirty="0"/>
+              <a:t>: Business intelligence metrics</a:t>
+            </a:r>
+          </a:p>
+          <a:p>
+            <a:r>
+              <a:rPr lang="en-US" b="1" dirty="0"/>
+              <a:t>Time Intelligence</a:t>
+            </a:r>
+            <a:r>
+              <a:rPr lang="en-US" dirty="0"/>
+              <a:t>: Month-over-month comparisons</a:t>
+            </a:r>
+          </a:p>
+          <a:p>
+            <a:r>
+              <a:rPr lang="en-US" b="1" dirty="0"/>
+              <a:t>Dynamic Calculations</a:t>
+            </a:r>
+            <a:r>
+              <a:rPr lang="en-US" dirty="0"/>
+              <a:t>: Context-aware computations</a:t>
             </a:r>
           </a:p>
           <a:p>
@@ -6945,7 +6951,7 @@
     </p:spTree>
     <p:extLst>
       <p:ext uri="{BB962C8B-B14F-4D97-AF65-F5344CB8AC3E}">
-        <p14:creationId xmlns:p14="http://schemas.microsoft.com/office/powerpoint/2010/main" val="3354655159"/>
+        <p14:creationId xmlns:p14="http://schemas.microsoft.com/office/powerpoint/2010/main" val="3486078744"/>
       </p:ext>
     </p:extLst>
   </p:cSld>
@@ -6977,7 +6983,7 @@
           <p:cNvPr id="2" name="Title 1">
             <a:extLst>
               <a:ext uri="{FF2B5EF4-FFF2-40B4-BE49-F238E27FC236}">
-                <a16:creationId xmlns:a16="http://schemas.microsoft.com/office/drawing/2014/main" id="{1898C09B-60F9-52CA-DE7E-A0E6E5023B8A}"/>
+                <a16:creationId xmlns:a16="http://schemas.microsoft.com/office/drawing/2014/main" id="{02010BEE-4B05-3590-F3B9-62222C76D0EB}"/>
               </a:ext>
             </a:extLst>
           </p:cNvPr>
@@ -6993,10 +6999,6 @@
           <a:bodyPr/>
           <a:lstStyle/>
           <a:p>
-            <a:r>
-              <a:rPr lang="en-US" b="1" dirty="0"/>
-              <a:t> </a:t>
-            </a:r>
             <a:r>
               <a:rPr lang="en-US" b="1" dirty="0">
                 <a:solidFill>
@@ -7005,7 +7007,7 @@
                   </a:schemeClr>
                 </a:solidFill>
               </a:rPr>
-              <a:t>BUSINESS RECOMMENDATIONS</a:t>
+              <a:t>KEY INSIGHTS SUMMARY</a:t>
             </a:r>
             <a:br>
               <a:rPr lang="en-US" dirty="0"/>
@@ -7019,7 +7021,7 @@
           <p:cNvPr id="3" name="Content Placeholder 2">
             <a:extLst>
               <a:ext uri="{FF2B5EF4-FFF2-40B4-BE49-F238E27FC236}">
-                <a16:creationId xmlns:a16="http://schemas.microsoft.com/office/drawing/2014/main" id="{98C5A507-A720-1412-838B-C01BD6EA2E3C}"/>
+                <a16:creationId xmlns:a16="http://schemas.microsoft.com/office/drawing/2014/main" id="{2DFBBAA8-A289-9F90-C92A-8AABF10D13A5}"/>
               </a:ext>
             </a:extLst>
           </p:cNvPr>
@@ -7033,7 +7035,7 @@
         <p:spPr/>
         <p:txBody>
           <a:bodyPr>
-            <a:normAutofit fontScale="62500" lnSpcReduction="20000"/>
+            <a:normAutofit fontScale="85000" lnSpcReduction="20000"/>
           </a:bodyPr>
           <a:lstStyle/>
           <a:p>
@@ -7042,11 +7044,37 @@
             </a:pPr>
             <a:r>
               <a:rPr lang="en-US" b="1" dirty="0"/>
-              <a:t>Immediate Actions</a:t>
-            </a:r>
-            <a:r>
-              <a:rPr lang="en-US" dirty="0"/>
-              <a:t> (0-6 months):</a:t>
+              <a:t>🔍 Temporal Insights</a:t>
+            </a:r>
+            <a:r>
+              <a:rPr lang="en-US" dirty="0"/>
+              <a:t>:</a:t>
+            </a:r>
+          </a:p>
+          <a:p>
+            <a:r>
+              <a:rPr lang="en-US" dirty="0"/>
+              <a:t>Peak consumption: 7 PM (150 </a:t>
+            </a:r>
+            <a:r>
+              <a:rPr lang="en-US" dirty="0" err="1"/>
+              <a:t>Wh</a:t>
+            </a:r>
+            <a:r>
+              <a:rPr lang="en-US" dirty="0"/>
+              <a:t> average)</a:t>
+            </a:r>
+          </a:p>
+          <a:p>
+            <a:r>
+              <a:rPr lang="en-US" dirty="0"/>
+              <a:t>Weekend consumption 15% higher than weekdays</a:t>
+            </a:r>
+          </a:p>
+          <a:p>
+            <a:r>
+              <a:rPr lang="en-US" dirty="0"/>
+              <a:t>Clear seasonal patterns (Winter vs Spring)</a:t>
             </a:r>
           </a:p>
           <a:p>
@@ -7057,50 +7085,38 @@
               <a:rPr lang="en-US" dirty="0"/>
             </a:br>
             <a:r>
-              <a:rPr lang="en-US" dirty="0"/>
-              <a:t>1. </a:t>
-            </a:r>
-            <a:r>
-              <a:rPr lang="en-US" b="1" dirty="0"/>
-              <a:t>Smart Scheduling</a:t>
-            </a:r>
-            <a:r>
-              <a:rPr lang="en-US" dirty="0"/>
-              <a:t>: Time-of-use pricing for peak hours (18-24)</a:t>
-            </a:r>
-          </a:p>
-          <a:p>
-            <a:pPr marL="0" indent="0">
-              <a:buNone/>
-            </a:pPr>
-            <a:r>
-              <a:rPr lang="en-US" dirty="0"/>
-              <a:t>2. </a:t>
-            </a:r>
-            <a:r>
-              <a:rPr lang="en-US" b="1" dirty="0"/>
-              <a:t>Weather Integration</a:t>
-            </a:r>
-            <a:r>
-              <a:rPr lang="en-US" dirty="0"/>
-              <a:t>: HVAC optimization based on forecasts</a:t>
-            </a:r>
-          </a:p>
-          <a:p>
-            <a:pPr marL="0" indent="0">
-              <a:buNone/>
-            </a:pPr>
-            <a:r>
-              <a:rPr lang="en-US" dirty="0"/>
-              <a:t>3. </a:t>
-            </a:r>
-            <a:r>
-              <a:rPr lang="en-US" b="1" dirty="0"/>
-              <a:t>Consumer Education</a:t>
-            </a:r>
-            <a:r>
-              <a:rPr lang="en-US" dirty="0"/>
-              <a:t>: Real-time consumption feedback</a:t>
+              <a:rPr lang="en-US" b="1" dirty="0"/>
+              <a:t>🌡️ Weather Impact</a:t>
+            </a:r>
+            <a:r>
+              <a:rPr lang="en-US" dirty="0"/>
+              <a:t>:</a:t>
+            </a:r>
+          </a:p>
+          <a:p>
+            <a:r>
+              <a:rPr lang="en-US" dirty="0"/>
+              <a:t>1°C temperature drop → 8 </a:t>
+            </a:r>
+            <a:r>
+              <a:rPr lang="en-US" dirty="0" err="1"/>
+              <a:t>Wh</a:t>
+            </a:r>
+            <a:r>
+              <a:rPr lang="en-US" dirty="0"/>
+              <a:t> increase</a:t>
+            </a:r>
+          </a:p>
+          <a:p>
+            <a:r>
+              <a:rPr lang="en-US" dirty="0"/>
+              <a:t>Indoor temperature variance = strongest predictor</a:t>
+            </a:r>
+          </a:p>
+          <a:p>
+            <a:r>
+              <a:rPr lang="en-US" dirty="0"/>
+              <a:t>Comfort index optimal range: 60-80</a:t>
             </a:r>
           </a:p>
           <a:p>
@@ -7112,71 +7128,7 @@
             </a:br>
             <a:r>
               <a:rPr lang="en-US" b="1" dirty="0"/>
-              <a:t>Strategic Initiatives</a:t>
-            </a:r>
-            <a:r>
-              <a:rPr lang="en-US" dirty="0"/>
-              <a:t> (6-18 months):</a:t>
-            </a:r>
-          </a:p>
-          <a:p>
-            <a:pPr marL="0" indent="0">
-              <a:buNone/>
-            </a:pPr>
-            <a:r>
-              <a:rPr lang="en-US" dirty="0"/>
-              <a:t> 4. </a:t>
-            </a:r>
-            <a:r>
-              <a:rPr lang="en-US" b="1" dirty="0"/>
-              <a:t>Predictive Maintenance</a:t>
-            </a:r>
-            <a:r>
-              <a:rPr lang="en-US" dirty="0"/>
-              <a:t>: Deploy models for demand forecasting</a:t>
-            </a:r>
-          </a:p>
-          <a:p>
-            <a:pPr marL="0" indent="0">
-              <a:buNone/>
-            </a:pPr>
-            <a:r>
-              <a:rPr lang="en-US" dirty="0"/>
-              <a:t> 5. </a:t>
-            </a:r>
-            <a:r>
-              <a:rPr lang="en-US" b="1" dirty="0"/>
-              <a:t>Grid Optimization</a:t>
-            </a:r>
-            <a:r>
-              <a:rPr lang="en-US" dirty="0"/>
-              <a:t>: Integrate with smart grid systems </a:t>
-            </a:r>
-          </a:p>
-          <a:p>
-            <a:pPr marL="0" indent="0">
-              <a:buNone/>
-            </a:pPr>
-            <a:r>
-              <a:rPr lang="en-US" dirty="0"/>
-              <a:t>6. </a:t>
-            </a:r>
-            <a:r>
-              <a:rPr lang="en-US" b="1" dirty="0"/>
-              <a:t>Behavioral Programs</a:t>
-            </a:r>
-            <a:r>
-              <a:rPr lang="en-US" dirty="0"/>
-              <a:t>: Target evening efficiency measures</a:t>
-            </a:r>
-          </a:p>
-          <a:p>
-            <a:pPr marL="0" indent="0">
-              <a:buNone/>
-            </a:pPr>
-            <a:r>
-              <a:rPr lang="en-US" b="1" dirty="0"/>
-              <a:t>Expected ROI</a:t>
+              <a:t>📊 Model Performance</a:t>
             </a:r>
             <a:r>
               <a:rPr lang="en-US" dirty="0"/>
@@ -7186,29 +7138,22 @@
           <a:p>
             <a:r>
               <a:rPr lang="en-US" dirty="0"/>
-              <a:t>10-15% energy savings through optimization</a:t>
-            </a:r>
-          </a:p>
-          <a:p>
-            <a:r>
-              <a:rPr lang="en-US" dirty="0"/>
-              <a:t>20% peak demand reduction</a:t>
-            </a:r>
-          </a:p>
-          <a:p>
-            <a:r>
-              <a:rPr lang="en-US" dirty="0"/>
-              <a:t>30% improvement in forecasting accuracy</a:t>
-            </a:r>
-          </a:p>
-          <a:p>
-            <a:pPr marL="0" indent="0">
-              <a:buNone/>
-            </a:pPr>
-            <a:br>
-              <a:rPr lang="en-US" dirty="0"/>
-            </a:br>
-            <a:endParaRPr lang="en-US" dirty="0"/>
+              <a:t>75.8% prediction accuracy achieved (Random Forest)</a:t>
+            </a:r>
+          </a:p>
+          <a:p>
+            <a:r>
+              <a:rPr lang="en-US" dirty="0"/>
+              <a:t>Average error: ±21.10 </a:t>
+            </a:r>
+            <a:r>
+              <a:rPr lang="en-US" dirty="0" err="1"/>
+              <a:t>Wh</a:t>
+            </a:r>
+            <a:r>
+              <a:rPr lang="en-US" dirty="0"/>
+              <a:t> (Random Forest best model)</a:t>
+            </a:r>
           </a:p>
           <a:p>
             <a:endParaRPr lang="en-US" dirty="0"/>
@@ -7218,7 +7163,7 @@
     </p:spTree>
     <p:extLst>
       <p:ext uri="{BB962C8B-B14F-4D97-AF65-F5344CB8AC3E}">
-        <p14:creationId xmlns:p14="http://schemas.microsoft.com/office/powerpoint/2010/main" val="472688397"/>
+        <p14:creationId xmlns:p14="http://schemas.microsoft.com/office/powerpoint/2010/main" val="3354655159"/>
       </p:ext>
     </p:extLst>
   </p:cSld>
@@ -7250,7 +7195,7 @@
           <p:cNvPr id="2" name="Title 1">
             <a:extLst>
               <a:ext uri="{FF2B5EF4-FFF2-40B4-BE49-F238E27FC236}">
-                <a16:creationId xmlns:a16="http://schemas.microsoft.com/office/drawing/2014/main" id="{E447B52A-6C73-6C52-9630-3A197B1F43B6}"/>
+                <a16:creationId xmlns:a16="http://schemas.microsoft.com/office/drawing/2014/main" id="{1898C09B-60F9-52CA-DE7E-A0E6E5023B8A}"/>
               </a:ext>
             </a:extLst>
           </p:cNvPr>
@@ -7266,6 +7211,10 @@
           <a:bodyPr/>
           <a:lstStyle/>
           <a:p>
+            <a:r>
+              <a:rPr lang="en-US" b="1" dirty="0"/>
+              <a:t> </a:t>
+            </a:r>
             <a:r>
               <a:rPr lang="en-US" b="1" dirty="0">
                 <a:solidFill>
@@ -7274,7 +7223,7 @@
                   </a:schemeClr>
                 </a:solidFill>
               </a:rPr>
-              <a:t>FUTURE ENHANCEMENTS</a:t>
+              <a:t>BUSINESS RECOMMENDATIONS</a:t>
             </a:r>
             <a:br>
               <a:rPr lang="en-US" dirty="0"/>
@@ -7288,7 +7237,7 @@
           <p:cNvPr id="3" name="Content Placeholder 2">
             <a:extLst>
               <a:ext uri="{FF2B5EF4-FFF2-40B4-BE49-F238E27FC236}">
-                <a16:creationId xmlns:a16="http://schemas.microsoft.com/office/drawing/2014/main" id="{46388F42-8AB8-37D6-9009-B4E936C60E88}"/>
+                <a16:creationId xmlns:a16="http://schemas.microsoft.com/office/drawing/2014/main" id="{98C5A507-A720-1412-838B-C01BD6EA2E3C}"/>
               </a:ext>
             </a:extLst>
           </p:cNvPr>
@@ -7302,7 +7251,7 @@
         <p:spPr/>
         <p:txBody>
           <a:bodyPr>
-            <a:normAutofit fontScale="55000" lnSpcReduction="20000"/>
+            <a:normAutofit fontScale="62500" lnSpcReduction="20000"/>
           </a:bodyPr>
           <a:lstStyle/>
           <a:p>
@@ -7311,61 +7260,11 @@
             </a:pPr>
             <a:r>
               <a:rPr lang="en-US" b="1" dirty="0"/>
-              <a:t>Next Steps &amp; Advanced Analytics</a:t>
-            </a:r>
-            <a:endParaRPr lang="en-US" dirty="0"/>
-          </a:p>
-          <a:p>
-            <a:pPr marL="0" indent="0">
-              <a:buNone/>
-            </a:pPr>
-            <a:r>
-              <a:rPr lang="en-US" b="1" dirty="0"/>
-              <a:t>Technical Improvements</a:t>
-            </a:r>
-            <a:r>
-              <a:rPr lang="en-US" dirty="0"/>
-              <a:t>:</a:t>
-            </a:r>
-          </a:p>
-          <a:p>
-            <a:r>
-              <a:rPr lang="en-US" b="1" dirty="0"/>
-              <a:t>Deep Learning</a:t>
-            </a:r>
-            <a:r>
-              <a:rPr lang="en-US" dirty="0"/>
-              <a:t>: LSTM networks for time series</a:t>
-            </a:r>
-          </a:p>
-          <a:p>
-            <a:r>
-              <a:rPr lang="en-US" b="1" dirty="0"/>
-              <a:t>Real-time Integration</a:t>
-            </a:r>
-            <a:r>
-              <a:rPr lang="en-US" dirty="0"/>
-              <a:t>: Live sensor data streams</a:t>
-            </a:r>
-          </a:p>
-          <a:p>
-            <a:r>
-              <a:rPr lang="en-US" b="1" dirty="0"/>
-              <a:t>External Data</a:t>
-            </a:r>
-            <a:r>
-              <a:rPr lang="en-US" dirty="0"/>
-              <a:t>: Economic indicators, occupancy patterns</a:t>
-            </a:r>
-          </a:p>
-          <a:p>
-            <a:r>
-              <a:rPr lang="en-US" b="1" dirty="0"/>
-              <a:t>Advanced Features</a:t>
-            </a:r>
-            <a:r>
-              <a:rPr lang="en-US" dirty="0"/>
-              <a:t>: Anomaly detection, automated alerts</a:t>
+              <a:t>Immediate Actions</a:t>
+            </a:r>
+            <a:r>
+              <a:rPr lang="en-US" dirty="0"/>
+              <a:t> (0-6 months):</a:t>
             </a:r>
           </a:p>
           <a:p>
@@ -7376,42 +7275,50 @@
               <a:rPr lang="en-US" dirty="0"/>
             </a:br>
             <a:r>
-              <a:rPr lang="en-US" b="1" dirty="0"/>
-              <a:t>Business Applications</a:t>
-            </a:r>
-            <a:r>
-              <a:rPr lang="en-US" dirty="0"/>
-              <a:t>:</a:t>
-            </a:r>
-          </a:p>
-          <a:p>
-            <a:r>
-              <a:rPr lang="en-US" b="1" dirty="0"/>
-              <a:t>Mobile App</a:t>
-            </a:r>
-            <a:r>
-              <a:rPr lang="en-US" dirty="0"/>
-              <a:t>: Consumer energy management</a:t>
-            </a:r>
-          </a:p>
-          <a:p>
-            <a:r>
-              <a:rPr lang="en-US" b="1" dirty="0"/>
-              <a:t>IoT Integration</a:t>
-            </a:r>
-            <a:r>
-              <a:rPr lang="en-US" dirty="0"/>
-              <a:t>: Smart device optimization</a:t>
-            </a:r>
-          </a:p>
-          <a:p>
-            <a:r>
-              <a:rPr lang="en-US" b="1" dirty="0"/>
-              <a:t>Utility Scale</a:t>
-            </a:r>
-            <a:r>
-              <a:rPr lang="en-US" dirty="0"/>
-              <a:t>: Grid-level demand management</a:t>
+              <a:rPr lang="en-US" dirty="0"/>
+              <a:t>1. </a:t>
+            </a:r>
+            <a:r>
+              <a:rPr lang="en-US" b="1" dirty="0"/>
+              <a:t>Smart Scheduling</a:t>
+            </a:r>
+            <a:r>
+              <a:rPr lang="en-US" dirty="0"/>
+              <a:t>: Time-of-use pricing for peak hours (18-24)</a:t>
+            </a:r>
+          </a:p>
+          <a:p>
+            <a:pPr marL="0" indent="0">
+              <a:buNone/>
+            </a:pPr>
+            <a:r>
+              <a:rPr lang="en-US" dirty="0"/>
+              <a:t>2. </a:t>
+            </a:r>
+            <a:r>
+              <a:rPr lang="en-US" b="1" dirty="0"/>
+              <a:t>Weather Integration</a:t>
+            </a:r>
+            <a:r>
+              <a:rPr lang="en-US" dirty="0"/>
+              <a:t>: HVAC optimization based on forecasts</a:t>
+            </a:r>
+          </a:p>
+          <a:p>
+            <a:pPr marL="0" indent="0">
+              <a:buNone/>
+            </a:pPr>
+            <a:r>
+              <a:rPr lang="en-US" dirty="0"/>
+              <a:t>3. </a:t>
+            </a:r>
+            <a:r>
+              <a:rPr lang="en-US" b="1" dirty="0"/>
+              <a:t>Consumer Education</a:t>
+            </a:r>
+            <a:r>
+              <a:rPr lang="en-US" dirty="0"/>
+              <a:t>: Real-time consumption feedback</a:t>
             </a:r>
           </a:p>
           <a:p>
@@ -7423,7 +7330,71 @@
             </a:br>
             <a:r>
               <a:rPr lang="en-US" b="1" dirty="0"/>
-              <a:t>Research Extensions</a:t>
+              <a:t>Strategic Initiatives</a:t>
+            </a:r>
+            <a:r>
+              <a:rPr lang="en-US" dirty="0"/>
+              <a:t> (6-18 months):</a:t>
+            </a:r>
+          </a:p>
+          <a:p>
+            <a:pPr marL="0" indent="0">
+              <a:buNone/>
+            </a:pPr>
+            <a:r>
+              <a:rPr lang="en-US" dirty="0"/>
+              <a:t> 4. </a:t>
+            </a:r>
+            <a:r>
+              <a:rPr lang="en-US" b="1" dirty="0"/>
+              <a:t>Predictive Maintenance</a:t>
+            </a:r>
+            <a:r>
+              <a:rPr lang="en-US" dirty="0"/>
+              <a:t>: Deploy models for demand forecasting</a:t>
+            </a:r>
+          </a:p>
+          <a:p>
+            <a:pPr marL="0" indent="0">
+              <a:buNone/>
+            </a:pPr>
+            <a:r>
+              <a:rPr lang="en-US" dirty="0"/>
+              <a:t> 5. </a:t>
+            </a:r>
+            <a:r>
+              <a:rPr lang="en-US" b="1" dirty="0"/>
+              <a:t>Grid Optimization</a:t>
+            </a:r>
+            <a:r>
+              <a:rPr lang="en-US" dirty="0"/>
+              <a:t>: Integrate with smart grid systems </a:t>
+            </a:r>
+          </a:p>
+          <a:p>
+            <a:pPr marL="0" indent="0">
+              <a:buNone/>
+            </a:pPr>
+            <a:r>
+              <a:rPr lang="en-US" dirty="0"/>
+              <a:t>6. </a:t>
+            </a:r>
+            <a:r>
+              <a:rPr lang="en-US" b="1" dirty="0"/>
+              <a:t>Behavioral Programs</a:t>
+            </a:r>
+            <a:r>
+              <a:rPr lang="en-US" dirty="0"/>
+              <a:t>: Target evening efficiency measures</a:t>
+            </a:r>
+          </a:p>
+          <a:p>
+            <a:pPr marL="0" indent="0">
+              <a:buNone/>
+            </a:pPr>
+            <a:r>
+              <a:rPr lang="en-US" b="1" dirty="0"/>
+              <a:t>Expected ROI</a:t>
             </a:r>
             <a:r>
               <a:rPr lang="en-US" dirty="0"/>
@@ -7433,20 +7404,29 @@
           <a:p>
             <a:r>
               <a:rPr lang="en-US" dirty="0"/>
-              <a:t>Multi-household analysis</a:t>
-            </a:r>
-          </a:p>
-          <a:p>
-            <a:r>
-              <a:rPr lang="en-US" dirty="0"/>
-              <a:t>Renewable energy integration</a:t>
-            </a:r>
-          </a:p>
-          <a:p>
-            <a:r>
-              <a:rPr lang="en-US" dirty="0"/>
-              <a:t>Carbon footprint optimization</a:t>
-            </a:r>
+              <a:t>10-15% energy savings through optimization</a:t>
+            </a:r>
+          </a:p>
+          <a:p>
+            <a:r>
+              <a:rPr lang="en-US" dirty="0"/>
+              <a:t>20% peak demand reduction</a:t>
+            </a:r>
+          </a:p>
+          <a:p>
+            <a:r>
+              <a:rPr lang="en-US" dirty="0"/>
+              <a:t>30% improvement in forecasting accuracy</a:t>
+            </a:r>
+          </a:p>
+          <a:p>
+            <a:pPr marL="0" indent="0">
+              <a:buNone/>
+            </a:pPr>
+            <a:br>
+              <a:rPr lang="en-US" dirty="0"/>
+            </a:br>
+            <a:endParaRPr lang="en-US" dirty="0"/>
           </a:p>
           <a:p>
             <a:endParaRPr lang="en-US" dirty="0"/>
@@ -7456,7 +7436,7 @@
     </p:spTree>
     <p:extLst>
       <p:ext uri="{BB962C8B-B14F-4D97-AF65-F5344CB8AC3E}">
-        <p14:creationId xmlns:p14="http://schemas.microsoft.com/office/powerpoint/2010/main" val="2719485191"/>
+        <p14:creationId xmlns:p14="http://schemas.microsoft.com/office/powerpoint/2010/main" val="472688397"/>
       </p:ext>
     </p:extLst>
   </p:cSld>
@@ -7488,6 +7468,244 @@
           <p:cNvPr id="2" name="Title 1">
             <a:extLst>
               <a:ext uri="{FF2B5EF4-FFF2-40B4-BE49-F238E27FC236}">
+                <a16:creationId xmlns:a16="http://schemas.microsoft.com/office/drawing/2014/main" id="{E447B52A-6C73-6C52-9630-3A197B1F43B6}"/>
+              </a:ext>
+            </a:extLst>
+          </p:cNvPr>
+          <p:cNvSpPr>
+            <a:spLocks noGrp="1"/>
+          </p:cNvSpPr>
+          <p:nvPr>
+            <p:ph type="title"/>
+          </p:nvPr>
+        </p:nvSpPr>
+        <p:spPr/>
+        <p:txBody>
+          <a:bodyPr/>
+          <a:lstStyle/>
+          <a:p>
+            <a:r>
+              <a:rPr lang="en-US" b="1" dirty="0">
+                <a:solidFill>
+                  <a:schemeClr val="accent2">
+                    <a:lumMod val="75000"/>
+                  </a:schemeClr>
+                </a:solidFill>
+              </a:rPr>
+              <a:t>FUTURE ENHANCEMENTS</a:t>
+            </a:r>
+            <a:br>
+              <a:rPr lang="en-US" dirty="0"/>
+            </a:br>
+            <a:endParaRPr lang="en-US" dirty="0"/>
+          </a:p>
+        </p:txBody>
+      </p:sp>
+      <p:sp>
+        <p:nvSpPr>
+          <p:cNvPr id="3" name="Content Placeholder 2">
+            <a:extLst>
+              <a:ext uri="{FF2B5EF4-FFF2-40B4-BE49-F238E27FC236}">
+                <a16:creationId xmlns:a16="http://schemas.microsoft.com/office/drawing/2014/main" id="{46388F42-8AB8-37D6-9009-B4E936C60E88}"/>
+              </a:ext>
+            </a:extLst>
+          </p:cNvPr>
+          <p:cNvSpPr>
+            <a:spLocks noGrp="1"/>
+          </p:cNvSpPr>
+          <p:nvPr>
+            <p:ph idx="1"/>
+          </p:nvPr>
+        </p:nvSpPr>
+        <p:spPr/>
+        <p:txBody>
+          <a:bodyPr>
+            <a:normAutofit fontScale="55000" lnSpcReduction="20000"/>
+          </a:bodyPr>
+          <a:lstStyle/>
+          <a:p>
+            <a:pPr marL="0" indent="0">
+              <a:buNone/>
+            </a:pPr>
+            <a:r>
+              <a:rPr lang="en-US" b="1" dirty="0"/>
+              <a:t>Next Steps &amp; Advanced Analytics</a:t>
+            </a:r>
+            <a:endParaRPr lang="en-US" dirty="0"/>
+          </a:p>
+          <a:p>
+            <a:pPr marL="0" indent="0">
+              <a:buNone/>
+            </a:pPr>
+            <a:r>
+              <a:rPr lang="en-US" b="1" dirty="0"/>
+              <a:t>Technical Improvements</a:t>
+            </a:r>
+            <a:r>
+              <a:rPr lang="en-US" dirty="0"/>
+              <a:t>:</a:t>
+            </a:r>
+          </a:p>
+          <a:p>
+            <a:r>
+              <a:rPr lang="en-US" b="1" dirty="0"/>
+              <a:t>Deep Learning</a:t>
+            </a:r>
+            <a:r>
+              <a:rPr lang="en-US" dirty="0"/>
+              <a:t>: LSTM networks for time series</a:t>
+            </a:r>
+          </a:p>
+          <a:p>
+            <a:r>
+              <a:rPr lang="en-US" b="1" dirty="0"/>
+              <a:t>Real-time Integration</a:t>
+            </a:r>
+            <a:r>
+              <a:rPr lang="en-US" dirty="0"/>
+              <a:t>: Live sensor data streams</a:t>
+            </a:r>
+          </a:p>
+          <a:p>
+            <a:r>
+              <a:rPr lang="en-US" b="1" dirty="0"/>
+              <a:t>External Data</a:t>
+            </a:r>
+            <a:r>
+              <a:rPr lang="en-US" dirty="0"/>
+              <a:t>: Economic indicators, occupancy patterns</a:t>
+            </a:r>
+          </a:p>
+          <a:p>
+            <a:r>
+              <a:rPr lang="en-US" b="1" dirty="0"/>
+              <a:t>Advanced Features</a:t>
+            </a:r>
+            <a:r>
+              <a:rPr lang="en-US" dirty="0"/>
+              <a:t>: Anomaly detection, automated alerts</a:t>
+            </a:r>
+          </a:p>
+          <a:p>
+            <a:pPr marL="0" indent="0">
+              <a:buNone/>
+            </a:pPr>
+            <a:br>
+              <a:rPr lang="en-US" dirty="0"/>
+            </a:br>
+            <a:r>
+              <a:rPr lang="en-US" b="1" dirty="0"/>
+              <a:t>Business Applications</a:t>
+            </a:r>
+            <a:r>
+              <a:rPr lang="en-US" dirty="0"/>
+              <a:t>:</a:t>
+            </a:r>
+          </a:p>
+          <a:p>
+            <a:r>
+              <a:rPr lang="en-US" b="1" dirty="0"/>
+              <a:t>Mobile App</a:t>
+            </a:r>
+            <a:r>
+              <a:rPr lang="en-US" dirty="0"/>
+              <a:t>: Consumer energy management</a:t>
+            </a:r>
+          </a:p>
+          <a:p>
+            <a:r>
+              <a:rPr lang="en-US" b="1" dirty="0"/>
+              <a:t>IoT Integration</a:t>
+            </a:r>
+            <a:r>
+              <a:rPr lang="en-US" dirty="0"/>
+              <a:t>: Smart device optimization</a:t>
+            </a:r>
+          </a:p>
+          <a:p>
+            <a:r>
+              <a:rPr lang="en-US" b="1" dirty="0"/>
+              <a:t>Utility Scale</a:t>
+            </a:r>
+            <a:r>
+              <a:rPr lang="en-US" dirty="0"/>
+              <a:t>: Grid-level demand management</a:t>
+            </a:r>
+          </a:p>
+          <a:p>
+            <a:pPr marL="0" indent="0">
+              <a:buNone/>
+            </a:pPr>
+            <a:br>
+              <a:rPr lang="en-US" dirty="0"/>
+            </a:br>
+            <a:r>
+              <a:rPr lang="en-US" b="1" dirty="0"/>
+              <a:t>Research Extensions</a:t>
+            </a:r>
+            <a:r>
+              <a:rPr lang="en-US" dirty="0"/>
+              <a:t>:</a:t>
+            </a:r>
+          </a:p>
+          <a:p>
+            <a:r>
+              <a:rPr lang="en-US" dirty="0"/>
+              <a:t>Multi-household analysis</a:t>
+            </a:r>
+          </a:p>
+          <a:p>
+            <a:r>
+              <a:rPr lang="en-US" dirty="0"/>
+              <a:t>Renewable energy integration</a:t>
+            </a:r>
+          </a:p>
+          <a:p>
+            <a:r>
+              <a:rPr lang="en-US" dirty="0"/>
+              <a:t>Carbon footprint optimization</a:t>
+            </a:r>
+          </a:p>
+          <a:p>
+            <a:endParaRPr lang="en-US" dirty="0"/>
+          </a:p>
+        </p:txBody>
+      </p:sp>
+    </p:spTree>
+    <p:extLst>
+      <p:ext uri="{BB962C8B-B14F-4D97-AF65-F5344CB8AC3E}">
+        <p14:creationId xmlns:p14="http://schemas.microsoft.com/office/powerpoint/2010/main" val="2719485191"/>
+      </p:ext>
+    </p:extLst>
+  </p:cSld>
+  <p:clrMapOvr>
+    <a:masterClrMapping/>
+  </p:clrMapOvr>
+</p:sld>
+</file>
+
+<file path=ppt/slides/slide18.xml><?xml version="1.0" encoding="utf-8"?>
+<p:sld xmlns:a="http://schemas.openxmlformats.org/drawingml/2006/main" xmlns:r="http://schemas.openxmlformats.org/officeDocument/2006/relationships" xmlns:p="http://schemas.openxmlformats.org/presentationml/2006/main">
+  <p:cSld>
+    <p:spTree>
+      <p:nvGrpSpPr>
+        <p:cNvPr id="1" name=""/>
+        <p:cNvGrpSpPr/>
+        <p:nvPr/>
+      </p:nvGrpSpPr>
+      <p:grpSpPr>
+        <a:xfrm>
+          <a:off x="0" y="0"/>
+          <a:ext cx="0" cy="0"/>
+          <a:chOff x="0" y="0"/>
+          <a:chExt cx="0" cy="0"/>
+        </a:xfrm>
+      </p:grpSpPr>
+      <p:sp>
+        <p:nvSpPr>
+          <p:cNvPr id="2" name="Title 1">
+            <a:extLst>
+              <a:ext uri="{FF2B5EF4-FFF2-40B4-BE49-F238E27FC236}">
                 <a16:creationId xmlns:a16="http://schemas.microsoft.com/office/drawing/2014/main" id="{B6974666-E434-D2BA-8380-B5E16D108E2D}"/>
               </a:ext>
             </a:extLst>
@@ -7680,7 +7898,7 @@
 </p:sld>
 </file>
 
-<file path=ppt/slides/slide18.xml><?xml version="1.0" encoding="utf-8"?>
+<file path=ppt/slides/slide19.xml><?xml version="1.0" encoding="utf-8"?>
 <p:sld xmlns:a="http://schemas.openxmlformats.org/drawingml/2006/main" xmlns:r="http://schemas.openxmlformats.org/officeDocument/2006/relationships" xmlns:p="http://schemas.openxmlformats.org/presentationml/2006/main">
   <p:cSld>
     <p:spTree>
@@ -7770,7 +7988,7 @@
           <p:cNvPr id="2" name="Title 1">
             <a:extLst>
               <a:ext uri="{FF2B5EF4-FFF2-40B4-BE49-F238E27FC236}">
-                <a16:creationId xmlns:a16="http://schemas.microsoft.com/office/drawing/2014/main" id="{A1698A21-5D91-D4A8-2638-D5A091977959}"/>
+                <a16:creationId xmlns:a16="http://schemas.microsoft.com/office/drawing/2014/main" id="{8AB230A3-3E20-D6CF-7E2E-8E94571066CD}"/>
               </a:ext>
             </a:extLst>
           </p:cNvPr>
@@ -7787,12 +8005,8 @@
           <a:lstStyle/>
           <a:p>
             <a:r>
-              <a:rPr lang="en-US" b="1" i="1" dirty="0">
-                <a:solidFill>
-                  <a:srgbClr val="FF0000"/>
-                </a:solidFill>
-              </a:rPr>
-              <a:t>AGENDA</a:t>
+              <a:rPr lang="en-US" dirty="0"/>
+              <a:t>LINKS</a:t>
             </a:r>
           </a:p>
         </p:txBody>
@@ -7802,7 +8016,7 @@
           <p:cNvPr id="3" name="Content Placeholder 2">
             <a:extLst>
               <a:ext uri="{FF2B5EF4-FFF2-40B4-BE49-F238E27FC236}">
-                <a16:creationId xmlns:a16="http://schemas.microsoft.com/office/drawing/2014/main" id="{215E8B1A-990B-1D90-26D0-5105212ED22B}"/>
+                <a16:creationId xmlns:a16="http://schemas.microsoft.com/office/drawing/2014/main" id="{A4E75779-03D9-4BF4-09D9-C683489925BD}"/>
               </a:ext>
             </a:extLst>
           </p:cNvPr>
@@ -7820,57 +8034,58 @@
           <a:p>
             <a:r>
               <a:rPr lang="en-US" dirty="0"/>
-              <a:t>- 🎯 Project Introduction &amp; Problem Definition</a:t>
-            </a:r>
-          </a:p>
-          <a:p>
-            <a:r>
-              <a:rPr lang="en-US" dirty="0"/>
-              <a:t>- 🔬 Methodology &amp; Technical Approach</a:t>
-            </a:r>
-          </a:p>
-          <a:p>
-            <a:r>
-              <a:rPr lang="en-US" dirty="0"/>
-              <a:t>- 📊 Python Analytics Results (Part 2)</a:t>
-            </a:r>
-          </a:p>
-          <a:p>
-            <a:r>
-              <a:rPr lang="en-US" dirty="0"/>
-              <a:t>- 🎨 Power BI Dashboard (Part 3)</a:t>
-            </a:r>
-          </a:p>
-          <a:p>
-            <a:r>
-              <a:rPr lang="en-US" dirty="0"/>
-              <a:t>- 💡 Business Recommendations</a:t>
-            </a:r>
-          </a:p>
-          <a:p>
-            <a:r>
-              <a:rPr lang="en-US" dirty="0"/>
-              <a:t>- 🔮 Future Work &amp; Conclusions</a:t>
+              <a:t>GitHub Repository (Complete Code &amp; Documentation):   </a:t>
+            </a:r>
+            <a:r>
+              <a:rPr lang="en-US" dirty="0">
+                <a:hlinkClick r:id="rId2"/>
+              </a:rPr>
+              <a:t>https://github.com/Esther-ingabire/EnergyCapstoneProject</a:t>
+            </a:r>
+            <a:endParaRPr lang="en-US" dirty="0"/>
+          </a:p>
+          <a:p>
+            <a:r>
+              <a:rPr lang="en-US" dirty="0"/>
+              <a:t> Dataset Used (UCI ML Repository):   </a:t>
+            </a:r>
+            <a:r>
+              <a:rPr lang="en-US" dirty="0">
+                <a:hlinkClick r:id="rId3"/>
+              </a:rPr>
+              <a:t>https://archive.ics.uci.edu/ml/datasets/Appliances+energy+prediction</a:t>
+            </a:r>
+            <a:endParaRPr lang="en-US" dirty="0"/>
+          </a:p>
+          <a:p>
+            <a:r>
+              <a:rPr lang="en-US" dirty="0"/>
+              <a:t>Power BI Dashboard (Interactive </a:t>
+            </a:r>
+            <a:r>
+              <a:rPr lang="en-US"/>
+              <a:t>Visualization):</a:t>
             </a:r>
           </a:p>
           <a:p>
             <a:pPr marL="0" indent="0">
               <a:buNone/>
             </a:pPr>
-            <a:br>
-              <a:rPr lang="en-US" dirty="0"/>
-            </a:br>
-            <a:endParaRPr lang="en-US" dirty="0"/>
-          </a:p>
-          <a:p>
-            <a:endParaRPr lang="en-US" dirty="0"/>
+            <a:r>
+              <a:rPr lang="en-US"/>
+              <a:t>   </a:t>
+            </a:r>
+            <a:r>
+              <a:rPr lang="en-US" dirty="0"/>
+              <a:t>(in the repo created)</a:t>
+            </a:r>
           </a:p>
         </p:txBody>
       </p:sp>
     </p:spTree>
     <p:extLst>
       <p:ext uri="{BB962C8B-B14F-4D97-AF65-F5344CB8AC3E}">
-        <p14:creationId xmlns:p14="http://schemas.microsoft.com/office/powerpoint/2010/main" val="3740539909"/>
+        <p14:creationId xmlns:p14="http://schemas.microsoft.com/office/powerpoint/2010/main" val="3812981274"/>
       </p:ext>
     </p:extLst>
   </p:cSld>
@@ -7902,7 +8117,7 @@
           <p:cNvPr id="2" name="Title 1">
             <a:extLst>
               <a:ext uri="{FF2B5EF4-FFF2-40B4-BE49-F238E27FC236}">
-                <a16:creationId xmlns:a16="http://schemas.microsoft.com/office/drawing/2014/main" id="{CCBF1E02-A3E3-F519-FFB3-ED3E00C102D5}"/>
+                <a16:creationId xmlns:a16="http://schemas.microsoft.com/office/drawing/2014/main" id="{A1698A21-5D91-D4A8-2638-D5A091977959}"/>
               </a:ext>
             </a:extLst>
           </p:cNvPr>
@@ -7919,19 +8134,13 @@
           <a:lstStyle/>
           <a:p>
             <a:r>
-              <a:rPr lang="en-US" b="1" dirty="0">
+              <a:rPr lang="en-US" b="1" i="1" dirty="0">
                 <a:solidFill>
-                  <a:schemeClr val="accent2">
-                    <a:lumMod val="75000"/>
-                  </a:schemeClr>
+                  <a:srgbClr val="FF0000"/>
                 </a:solidFill>
               </a:rPr>
-              <a:t>PROBLEM DEFINITION (PART 1)</a:t>
-            </a:r>
-            <a:br>
-              <a:rPr lang="en-US" dirty="0"/>
-            </a:br>
-            <a:endParaRPr lang="en-US" dirty="0"/>
+              <a:t>AGENDA</a:t>
+            </a:r>
           </a:p>
         </p:txBody>
       </p:sp>
@@ -7940,7 +8149,7 @@
           <p:cNvPr id="3" name="Content Placeholder 2">
             <a:extLst>
               <a:ext uri="{FF2B5EF4-FFF2-40B4-BE49-F238E27FC236}">
-                <a16:creationId xmlns:a16="http://schemas.microsoft.com/office/drawing/2014/main" id="{EBC82937-C0EF-C3D4-945E-2383B3E4CC77}"/>
+                <a16:creationId xmlns:a16="http://schemas.microsoft.com/office/drawing/2014/main" id="{215E8B1A-990B-1D90-26D0-5105212ED22B}"/>
               </a:ext>
             </a:extLst>
           </p:cNvPr>
@@ -7953,19 +8162,43 @@
         </p:nvSpPr>
         <p:spPr/>
         <p:txBody>
-          <a:bodyPr>
-            <a:normAutofit fontScale="92500" lnSpcReduction="20000"/>
-          </a:bodyPr>
+          <a:bodyPr/>
           <a:lstStyle/>
           <a:p>
-            <a:pPr marL="0" indent="0">
-              <a:buNone/>
-            </a:pPr>
-            <a:r>
-              <a:rPr lang="en-US" b="1" dirty="0"/>
-              <a:t>Sector &amp; Problem Statement</a:t>
-            </a:r>
-            <a:endParaRPr lang="en-US" dirty="0"/>
+            <a:r>
+              <a:rPr lang="en-US" dirty="0"/>
+              <a:t>- 🎯 Project Introduction &amp; Problem Definition</a:t>
+            </a:r>
+          </a:p>
+          <a:p>
+            <a:r>
+              <a:rPr lang="en-US" dirty="0"/>
+              <a:t>- 🔬 Methodology &amp; Technical Approach</a:t>
+            </a:r>
+          </a:p>
+          <a:p>
+            <a:r>
+              <a:rPr lang="en-US" dirty="0"/>
+              <a:t>- 📊 Python Analytics Results (Part 2)</a:t>
+            </a:r>
+          </a:p>
+          <a:p>
+            <a:r>
+              <a:rPr lang="en-US" dirty="0"/>
+              <a:t>- 🎨 Power BI Dashboard (Part 3)</a:t>
+            </a:r>
+          </a:p>
+          <a:p>
+            <a:r>
+              <a:rPr lang="en-US" dirty="0"/>
+              <a:t>- 💡 Business Recommendations</a:t>
+            </a:r>
+          </a:p>
+          <a:p>
+            <a:r>
+              <a:rPr lang="en-US" dirty="0"/>
+              <a:t>- 🔮 Future Work &amp; Conclusions</a:t>
+            </a:r>
           </a:p>
           <a:p>
             <a:pPr marL="0" indent="0">
@@ -7974,96 +8207,7 @@
             <a:br>
               <a:rPr lang="en-US" dirty="0"/>
             </a:br>
-            <a:r>
-              <a:rPr lang="en-US" b="1" dirty="0"/>
-              <a:t> Sector Selected</a:t>
-            </a:r>
-            <a:r>
-              <a:rPr lang="en-US" dirty="0"/>
-              <a:t>: Energy - Smart Home &amp; Utility Management</a:t>
-            </a:r>
-          </a:p>
-          <a:p>
-            <a:pPr marL="0" indent="0">
-              <a:buNone/>
-            </a:pPr>
-            <a:br>
-              <a:rPr lang="en-US" dirty="0"/>
-            </a:br>
-            <a:r>
-              <a:rPr lang="en-US" b="1" dirty="0"/>
-              <a:t>🎯 Research Question</a:t>
-            </a:r>
-            <a:r>
-              <a:rPr lang="en-US" dirty="0"/>
-              <a:t>:  </a:t>
-            </a:r>
-          </a:p>
-          <a:p>
-            <a:pPr marL="0" indent="0">
-              <a:buNone/>
-            </a:pPr>
-            <a:r>
-              <a:rPr lang="en-US" i="1" dirty="0"/>
-              <a:t>"Can we predict household energy consumption based on weather conditions, time patterns, and appliance usage?"</a:t>
-            </a:r>
             <a:endParaRPr lang="en-US" dirty="0"/>
-          </a:p>
-          <a:p>
-            <a:pPr marL="0" indent="0">
-              <a:buNone/>
-            </a:pPr>
-            <a:br>
-              <a:rPr lang="en-US" dirty="0"/>
-            </a:br>
-            <a:r>
-              <a:rPr lang="en-US" b="1" dirty="0"/>
-              <a:t>📊 Dataset</a:t>
-            </a:r>
-            <a:r>
-              <a:rPr lang="en-US" dirty="0"/>
-              <a:t>:</a:t>
-            </a:r>
-          </a:p>
-          <a:p>
-            <a:r>
-              <a:rPr lang="en-US" b="1" dirty="0"/>
-              <a:t>Source</a:t>
-            </a:r>
-            <a:r>
-              <a:rPr lang="en-US" dirty="0"/>
-              <a:t>: UCI ML Repository - Appliances Energy Prediction</a:t>
-            </a:r>
-          </a:p>
-          <a:p>
-            <a:r>
-              <a:rPr lang="en-US" b="1" dirty="0"/>
-              <a:t>Size</a:t>
-            </a:r>
-            <a:r>
-              <a:rPr lang="en-US" dirty="0"/>
-              <a:t>: 19,735 rows × 29 columns → 45+ features (enhanced)</a:t>
-            </a:r>
-          </a:p>
-          <a:p>
-            <a:r>
-              <a:rPr lang="en-US" b="1" dirty="0"/>
-              <a:t>Period</a:t>
-            </a:r>
-            <a:r>
-              <a:rPr lang="en-US" dirty="0"/>
-              <a:t>: 4.5 months (Jan-May 2016)</a:t>
-            </a:r>
-          </a:p>
-          <a:p>
-            <a:r>
-              <a:rPr lang="en-US" b="1" dirty="0"/>
-              <a:t>Granularity</a:t>
-            </a:r>
-            <a:r>
-              <a:rPr lang="en-US" dirty="0"/>
-              <a:t>: 10-minute intervals</a:t>
-            </a:r>
           </a:p>
           <a:p>
             <a:endParaRPr lang="en-US" dirty="0"/>
@@ -8073,7 +8217,7 @@
     </p:spTree>
     <p:extLst>
       <p:ext uri="{BB962C8B-B14F-4D97-AF65-F5344CB8AC3E}">
-        <p14:creationId xmlns:p14="http://schemas.microsoft.com/office/powerpoint/2010/main" val="2497506516"/>
+        <p14:creationId xmlns:p14="http://schemas.microsoft.com/office/powerpoint/2010/main" val="3740539909"/>
       </p:ext>
     </p:extLst>
   </p:cSld>
@@ -8105,7 +8249,7 @@
           <p:cNvPr id="2" name="Title 1">
             <a:extLst>
               <a:ext uri="{FF2B5EF4-FFF2-40B4-BE49-F238E27FC236}">
-                <a16:creationId xmlns:a16="http://schemas.microsoft.com/office/drawing/2014/main" id="{98C81785-C6BE-0EAE-267F-98BFE02F26DF}"/>
+                <a16:creationId xmlns:a16="http://schemas.microsoft.com/office/drawing/2014/main" id="{CCBF1E02-A3E3-F519-FFB3-ED3E00C102D5}"/>
               </a:ext>
             </a:extLst>
           </p:cNvPr>
@@ -8129,7 +8273,7 @@
                   </a:schemeClr>
                 </a:solidFill>
               </a:rPr>
-              <a:t>BUSINESS CONTEXT</a:t>
+              <a:t>PROBLEM DEFINITION (PART 1)</a:t>
             </a:r>
             <a:br>
               <a:rPr lang="en-US" dirty="0"/>
@@ -8143,7 +8287,7 @@
           <p:cNvPr id="3" name="Content Placeholder 2">
             <a:extLst>
               <a:ext uri="{FF2B5EF4-FFF2-40B4-BE49-F238E27FC236}">
-                <a16:creationId xmlns:a16="http://schemas.microsoft.com/office/drawing/2014/main" id="{894D87B5-179D-50DA-FCE4-681C210D7154}"/>
+                <a16:creationId xmlns:a16="http://schemas.microsoft.com/office/drawing/2014/main" id="{EBC82937-C0EF-C3D4-945E-2383B3E4CC77}"/>
               </a:ext>
             </a:extLst>
           </p:cNvPr>
@@ -8157,7 +8301,7 @@
         <p:spPr/>
         <p:txBody>
           <a:bodyPr>
-            <a:normAutofit fontScale="77500" lnSpcReduction="20000"/>
+            <a:normAutofit fontScale="92500" lnSpcReduction="20000"/>
           </a:bodyPr>
           <a:lstStyle/>
           <a:p>
@@ -8166,7 +8310,7 @@
             </a:pPr>
             <a:r>
               <a:rPr lang="en-US" b="1" dirty="0"/>
-              <a:t>  Why This Matters</a:t>
+              <a:t>Sector &amp; Problem Statement</a:t>
             </a:r>
             <a:endParaRPr lang="en-US" dirty="0"/>
           </a:p>
@@ -8174,9 +8318,54 @@
             <a:pPr marL="0" indent="0">
               <a:buNone/>
             </a:pPr>
-            <a:r>
-              <a:rPr lang="en-US" b="1" dirty="0"/>
-              <a:t>🏠 Smart Home Market</a:t>
+            <a:br>
+              <a:rPr lang="en-US" dirty="0"/>
+            </a:br>
+            <a:r>
+              <a:rPr lang="en-US" b="1" dirty="0"/>
+              <a:t> Sector Selected</a:t>
+            </a:r>
+            <a:r>
+              <a:rPr lang="en-US" dirty="0"/>
+              <a:t>: Energy - Smart Home &amp; Utility Management</a:t>
+            </a:r>
+          </a:p>
+          <a:p>
+            <a:pPr marL="0" indent="0">
+              <a:buNone/>
+            </a:pPr>
+            <a:br>
+              <a:rPr lang="en-US" dirty="0"/>
+            </a:br>
+            <a:r>
+              <a:rPr lang="en-US" b="1" dirty="0"/>
+              <a:t>🎯 Research Question</a:t>
+            </a:r>
+            <a:r>
+              <a:rPr lang="en-US" dirty="0"/>
+              <a:t>:  </a:t>
+            </a:r>
+          </a:p>
+          <a:p>
+            <a:pPr marL="0" indent="0">
+              <a:buNone/>
+            </a:pPr>
+            <a:r>
+              <a:rPr lang="en-US" i="1" dirty="0"/>
+              <a:t>"Can we predict household energy consumption based on weather conditions, time patterns, and appliance usage?"</a:t>
+            </a:r>
+            <a:endParaRPr lang="en-US" dirty="0"/>
+          </a:p>
+          <a:p>
+            <a:pPr marL="0" indent="0">
+              <a:buNone/>
+            </a:pPr>
+            <a:br>
+              <a:rPr lang="en-US" dirty="0"/>
+            </a:br>
+            <a:r>
+              <a:rPr lang="en-US" b="1" dirty="0"/>
+              <a:t>📊 Dataset</a:t>
             </a:r>
             <a:r>
               <a:rPr lang="en-US" dirty="0"/>
@@ -8185,82 +8374,42 @@
           </a:p>
           <a:p>
             <a:r>
-              <a:rPr lang="en-US" dirty="0"/>
-              <a:t>$80B market growing 25% annually</a:t>
-            </a:r>
-          </a:p>
-          <a:p>
-            <a:r>
-              <a:rPr lang="en-US" dirty="0"/>
-              <a:t> Energy costs rising 3-5% per year</a:t>
-            </a:r>
-          </a:p>
-          <a:p>
-            <a:r>
-              <a:rPr lang="en-US" dirty="0"/>
-              <a:t> Consumer demand for optimization</a:t>
-            </a:r>
-          </a:p>
-          <a:p>
-            <a:pPr marL="0" indent="0">
-              <a:buNone/>
-            </a:pPr>
-            <a:r>
-              <a:rPr lang="en-US" b="1" dirty="0"/>
-              <a:t>⚡ Utility Challenges</a:t>
-            </a:r>
-            <a:r>
-              <a:rPr lang="en-US" dirty="0"/>
-              <a:t>:</a:t>
-            </a:r>
-          </a:p>
-          <a:p>
-            <a:r>
-              <a:rPr lang="en-US" dirty="0"/>
-              <a:t>Peak demand management</a:t>
-            </a:r>
-          </a:p>
-          <a:p>
-            <a:r>
-              <a:rPr lang="en-US" dirty="0"/>
-              <a:t>Grid stability and efficiency</a:t>
-            </a:r>
-          </a:p>
-          <a:p>
-            <a:r>
-              <a:rPr lang="en-US" dirty="0"/>
-              <a:t>Renewable energy integration</a:t>
-            </a:r>
-          </a:p>
-          <a:p>
-            <a:pPr marL="0" indent="0">
-              <a:buNone/>
-            </a:pPr>
-            <a:r>
-              <a:rPr lang="en-US" b="1" dirty="0"/>
-              <a:t>🎯 Project Value</a:t>
-            </a:r>
-            <a:r>
-              <a:rPr lang="en-US" dirty="0"/>
-              <a:t>:</a:t>
-            </a:r>
-          </a:p>
-          <a:p>
-            <a:r>
-              <a:rPr lang="en-US" dirty="0"/>
-              <a:t>Predictive energy management</a:t>
-            </a:r>
-          </a:p>
-          <a:p>
-            <a:r>
-              <a:rPr lang="en-US" dirty="0"/>
-              <a:t>Cost reduction strategies</a:t>
-            </a:r>
-          </a:p>
-          <a:p>
-            <a:r>
-              <a:rPr lang="en-US" dirty="0"/>
-              <a:t>Environmental sustainability</a:t>
+              <a:rPr lang="en-US" b="1" dirty="0"/>
+              <a:t>Source</a:t>
+            </a:r>
+            <a:r>
+              <a:rPr lang="en-US" dirty="0"/>
+              <a:t>: UCI ML Repository - Appliances Energy Prediction</a:t>
+            </a:r>
+          </a:p>
+          <a:p>
+            <a:r>
+              <a:rPr lang="en-US" b="1" dirty="0"/>
+              <a:t>Size</a:t>
+            </a:r>
+            <a:r>
+              <a:rPr lang="en-US" dirty="0"/>
+              <a:t>: 19,735 rows × 29 columns → 45+ features (enhanced)</a:t>
+            </a:r>
+          </a:p>
+          <a:p>
+            <a:r>
+              <a:rPr lang="en-US" b="1" dirty="0"/>
+              <a:t>Period</a:t>
+            </a:r>
+            <a:r>
+              <a:rPr lang="en-US" dirty="0"/>
+              <a:t>: 4.5 months (Jan-May 2016)</a:t>
+            </a:r>
+          </a:p>
+          <a:p>
+            <a:r>
+              <a:rPr lang="en-US" b="1" dirty="0"/>
+              <a:t>Granularity</a:t>
+            </a:r>
+            <a:r>
+              <a:rPr lang="en-US" dirty="0"/>
+              <a:t>: 10-minute intervals</a:t>
             </a:r>
           </a:p>
           <a:p>
@@ -8271,7 +8420,7 @@
     </p:spTree>
     <p:extLst>
       <p:ext uri="{BB962C8B-B14F-4D97-AF65-F5344CB8AC3E}">
-        <p14:creationId xmlns:p14="http://schemas.microsoft.com/office/powerpoint/2010/main" val="3846504711"/>
+        <p14:creationId xmlns:p14="http://schemas.microsoft.com/office/powerpoint/2010/main" val="2497506516"/>
       </p:ext>
     </p:extLst>
   </p:cSld>
@@ -8303,7 +8452,7 @@
           <p:cNvPr id="2" name="Title 1">
             <a:extLst>
               <a:ext uri="{FF2B5EF4-FFF2-40B4-BE49-F238E27FC236}">
-                <a16:creationId xmlns:a16="http://schemas.microsoft.com/office/drawing/2014/main" id="{8900E3A1-0AC2-BBE2-6721-FE304F5885E0}"/>
+                <a16:creationId xmlns:a16="http://schemas.microsoft.com/office/drawing/2014/main" id="{98C81785-C6BE-0EAE-267F-98BFE02F26DF}"/>
               </a:ext>
             </a:extLst>
           </p:cNvPr>
@@ -8327,24 +8476,12 @@
                   </a:schemeClr>
                 </a:solidFill>
               </a:rPr>
-              <a:t>TECHNICAL APPROACH</a:t>
+              <a:t>BUSINESS CONTEXT</a:t>
             </a:r>
             <a:br>
-              <a:rPr lang="en-US" dirty="0">
-                <a:solidFill>
-                  <a:schemeClr val="accent2">
-                    <a:lumMod val="75000"/>
-                  </a:schemeClr>
-                </a:solidFill>
-              </a:rPr>
+              <a:rPr lang="en-US" dirty="0"/>
             </a:br>
-            <a:endParaRPr lang="en-US" dirty="0">
-              <a:solidFill>
-                <a:schemeClr val="accent2">
-                  <a:lumMod val="75000"/>
-                </a:schemeClr>
-              </a:solidFill>
-            </a:endParaRPr>
+            <a:endParaRPr lang="en-US" dirty="0"/>
           </a:p>
         </p:txBody>
       </p:sp>
@@ -8353,7 +8490,7 @@
           <p:cNvPr id="3" name="Content Placeholder 2">
             <a:extLst>
               <a:ext uri="{FF2B5EF4-FFF2-40B4-BE49-F238E27FC236}">
-                <a16:creationId xmlns:a16="http://schemas.microsoft.com/office/drawing/2014/main" id="{4CA2AC88-1F18-E13D-82A7-5860D5DED27C}"/>
+                <a16:creationId xmlns:a16="http://schemas.microsoft.com/office/drawing/2014/main" id="{894D87B5-179D-50DA-FCE4-681C210D7154}"/>
               </a:ext>
             </a:extLst>
           </p:cNvPr>
@@ -8367,7 +8504,7 @@
         <p:spPr/>
         <p:txBody>
           <a:bodyPr>
-            <a:normAutofit/>
+            <a:normAutofit fontScale="77500" lnSpcReduction="20000"/>
           </a:bodyPr>
           <a:lstStyle/>
           <a:p>
@@ -8376,7 +8513,7 @@
             </a:pPr>
             <a:r>
               <a:rPr lang="en-US" b="1" dirty="0"/>
-              <a:t>End-to-End Data Science Pipeline</a:t>
+              <a:t>  Why This Matters</a:t>
             </a:r>
             <a:endParaRPr lang="en-US" dirty="0"/>
           </a:p>
@@ -8385,16 +8522,30 @@
               <a:buNone/>
             </a:pPr>
             <a:r>
-              <a:rPr lang="en-US" dirty="0"/>
-              <a:t>Data Collection → Cleaning &amp; Preprocessing → Feature </a:t>
-            </a:r>
-            <a:r>
-              <a:rPr lang="en-US" dirty="0" err="1"/>
-              <a:t>Engineering→EDA</a:t>
-            </a:r>
-            <a:r>
-              <a:rPr lang="en-US" dirty="0"/>
-              <a:t> &amp; Visualization → Machine Learning → Model Evaluation →Power BI Dashboard → Business Insights</a:t>
+              <a:rPr lang="en-US" b="1" dirty="0"/>
+              <a:t>🏠 Smart Home Market</a:t>
+            </a:r>
+            <a:r>
+              <a:rPr lang="en-US" dirty="0"/>
+              <a:t>:</a:t>
+            </a:r>
+          </a:p>
+          <a:p>
+            <a:r>
+              <a:rPr lang="en-US" dirty="0"/>
+              <a:t>$80B market growing 25% annually</a:t>
+            </a:r>
+          </a:p>
+          <a:p>
+            <a:r>
+              <a:rPr lang="en-US" dirty="0"/>
+              <a:t> Energy costs rising 3-5% per year</a:t>
+            </a:r>
+          </a:p>
+          <a:p>
+            <a:r>
+              <a:rPr lang="en-US" dirty="0"/>
+              <a:t> Consumer demand for optimization</a:t>
             </a:r>
           </a:p>
           <a:p>
@@ -8403,7 +8554,7 @@
             </a:pPr>
             <a:r>
               <a:rPr lang="en-US" b="1" dirty="0"/>
-              <a:t>🛠️ Technical Stack</a:t>
+              <a:t>⚡ Utility Challenges</a:t>
             </a:r>
             <a:r>
               <a:rPr lang="en-US" dirty="0"/>
@@ -8411,42 +8562,52 @@
             </a:r>
           </a:p>
           <a:p>
+            <a:r>
+              <a:rPr lang="en-US" dirty="0"/>
+              <a:t>Peak demand management</a:t>
+            </a:r>
+          </a:p>
+          <a:p>
+            <a:r>
+              <a:rPr lang="en-US" dirty="0"/>
+              <a:t>Grid stability and efficiency</a:t>
+            </a:r>
+          </a:p>
+          <a:p>
+            <a:r>
+              <a:rPr lang="en-US" dirty="0"/>
+              <a:t>Renewable energy integration</a:t>
+            </a:r>
+          </a:p>
+          <a:p>
             <a:pPr marL="0" indent="0">
               <a:buNone/>
             </a:pPr>
             <a:r>
               <a:rPr lang="en-US" b="1" dirty="0"/>
-              <a:t>Python</a:t>
-            </a:r>
-            <a:r>
-              <a:rPr lang="en-US" dirty="0"/>
-              <a:t>: Pandas, Scikit-learn, Matplotlib</a:t>
-            </a:r>
-          </a:p>
-          <a:p>
-            <a:pPr marL="0" indent="0">
-              <a:buNone/>
-            </a:pPr>
-            <a:r>
-              <a:rPr lang="en-US" b="1" dirty="0"/>
-              <a:t>Power BI</a:t>
-            </a:r>
-            <a:r>
-              <a:rPr lang="en-US" dirty="0"/>
-              <a:t>: DAX, AI visuals, Interactive dashboards</a:t>
-            </a:r>
-          </a:p>
-          <a:p>
-            <a:pPr marL="0" indent="0">
-              <a:buNone/>
-            </a:pPr>
-            <a:r>
-              <a:rPr lang="en-US" b="1" dirty="0"/>
-              <a:t>ML Models</a:t>
-            </a:r>
-            <a:r>
-              <a:rPr lang="en-US" dirty="0"/>
-              <a:t>: Ensemble methods, Cross-validation</a:t>
+              <a:t>🎯 Project Value</a:t>
+            </a:r>
+            <a:r>
+              <a:rPr lang="en-US" dirty="0"/>
+              <a:t>:</a:t>
+            </a:r>
+          </a:p>
+          <a:p>
+            <a:r>
+              <a:rPr lang="en-US" dirty="0"/>
+              <a:t>Predictive energy management</a:t>
+            </a:r>
+          </a:p>
+          <a:p>
+            <a:r>
+              <a:rPr lang="en-US" dirty="0"/>
+              <a:t>Cost reduction strategies</a:t>
+            </a:r>
+          </a:p>
+          <a:p>
+            <a:r>
+              <a:rPr lang="en-US" dirty="0"/>
+              <a:t>Environmental sustainability</a:t>
             </a:r>
           </a:p>
           <a:p>
@@ -8457,7 +8618,7 @@
     </p:spTree>
     <p:extLst>
       <p:ext uri="{BB962C8B-B14F-4D97-AF65-F5344CB8AC3E}">
-        <p14:creationId xmlns:p14="http://schemas.microsoft.com/office/powerpoint/2010/main" val="3510047345"/>
+        <p14:creationId xmlns:p14="http://schemas.microsoft.com/office/powerpoint/2010/main" val="3846504711"/>
       </p:ext>
     </p:extLst>
   </p:cSld>
@@ -8489,7 +8650,7 @@
           <p:cNvPr id="2" name="Title 1">
             <a:extLst>
               <a:ext uri="{FF2B5EF4-FFF2-40B4-BE49-F238E27FC236}">
-                <a16:creationId xmlns:a16="http://schemas.microsoft.com/office/drawing/2014/main" id="{28E189EC-3959-4215-E048-67E97DA2A996}"/>
+                <a16:creationId xmlns:a16="http://schemas.microsoft.com/office/drawing/2014/main" id="{8900E3A1-0AC2-BBE2-6721-FE304F5885E0}"/>
               </a:ext>
             </a:extLst>
           </p:cNvPr>
@@ -8513,12 +8674,24 @@
                   </a:schemeClr>
                 </a:solidFill>
               </a:rPr>
-              <a:t>DATA PREPROCESSING ACHIEVEMENTS</a:t>
+              <a:t>TECHNICAL APPROACH</a:t>
             </a:r>
             <a:br>
-              <a:rPr lang="en-US" dirty="0"/>
+              <a:rPr lang="en-US" dirty="0">
+                <a:solidFill>
+                  <a:schemeClr val="accent2">
+                    <a:lumMod val="75000"/>
+                  </a:schemeClr>
+                </a:solidFill>
+              </a:rPr>
             </a:br>
-            <a:endParaRPr lang="en-US" dirty="0"/>
+            <a:endParaRPr lang="en-US" dirty="0">
+              <a:solidFill>
+                <a:schemeClr val="accent2">
+                  <a:lumMod val="75000"/>
+                </a:schemeClr>
+              </a:solidFill>
+            </a:endParaRPr>
           </a:p>
         </p:txBody>
       </p:sp>
@@ -8527,7 +8700,7 @@
           <p:cNvPr id="3" name="Content Placeholder 2">
             <a:extLst>
               <a:ext uri="{FF2B5EF4-FFF2-40B4-BE49-F238E27FC236}">
-                <a16:creationId xmlns:a16="http://schemas.microsoft.com/office/drawing/2014/main" id="{21B7084A-CD1A-9B2E-B462-B64EE0E4F8CD}"/>
+                <a16:creationId xmlns:a16="http://schemas.microsoft.com/office/drawing/2014/main" id="{4CA2AC88-1F18-E13D-82A7-5860D5DED27C}"/>
               </a:ext>
             </a:extLst>
           </p:cNvPr>
@@ -8550,7 +8723,34 @@
             </a:pPr>
             <a:r>
               <a:rPr lang="en-US" b="1" dirty="0"/>
-              <a:t>Data Quality Results</a:t>
+              <a:t>End-to-End Data Science Pipeline</a:t>
+            </a:r>
+            <a:endParaRPr lang="en-US" dirty="0"/>
+          </a:p>
+          <a:p>
+            <a:pPr marL="0" indent="0">
+              <a:buNone/>
+            </a:pPr>
+            <a:r>
+              <a:rPr lang="en-US" dirty="0"/>
+              <a:t>Data Collection → Cleaning &amp; Preprocessing → Feature </a:t>
+            </a:r>
+            <a:r>
+              <a:rPr lang="en-US" dirty="0" err="1"/>
+              <a:t>Engineering→EDA</a:t>
+            </a:r>
+            <a:r>
+              <a:rPr lang="en-US" dirty="0"/>
+              <a:t> &amp; Visualization → Machine Learning → Model Evaluation →Power BI Dashboard → Business Insights</a:t>
+            </a:r>
+          </a:p>
+          <a:p>
+            <a:pPr marL="0" indent="0">
+              <a:buNone/>
+            </a:pPr>
+            <a:r>
+              <a:rPr lang="en-US" b="1" dirty="0"/>
+              <a:t>🛠️ Technical Stack</a:t>
             </a:r>
             <a:r>
               <a:rPr lang="en-US" dirty="0"/>
@@ -8563,11 +8763,11 @@
             </a:pPr>
             <a:r>
               <a:rPr lang="en-US" b="1" dirty="0"/>
-              <a:t>Missing Values</a:t>
-            </a:r>
-            <a:r>
-              <a:rPr lang="en-US" dirty="0"/>
-              <a:t>: 0 found (excellent data quality)</a:t>
+              <a:t>Python</a:t>
+            </a:r>
+            <a:r>
+              <a:rPr lang="en-US" dirty="0"/>
+              <a:t>: Pandas, Scikit-learn, Matplotlib</a:t>
             </a:r>
           </a:p>
           <a:p>
@@ -8576,11 +8776,11 @@
             </a:pPr>
             <a:r>
               <a:rPr lang="en-US" b="1" dirty="0"/>
-              <a:t>Outliers</a:t>
-            </a:r>
-            <a:r>
-              <a:rPr lang="en-US" dirty="0"/>
-              <a:t>: IQR method applied (preserved 100% of data)</a:t>
+              <a:t>Power BI</a:t>
+            </a:r>
+            <a:r>
+              <a:rPr lang="en-US" dirty="0"/>
+              <a:t>: DAX, AI visuals, Interactive dashboards</a:t>
             </a:r>
           </a:p>
           <a:p>
@@ -8589,63 +8789,11 @@
             </a:pPr>
             <a:r>
               <a:rPr lang="en-US" b="1" dirty="0"/>
-              <a:t>Transformations</a:t>
-            </a:r>
-            <a:r>
-              <a:rPr lang="en-US" dirty="0"/>
-              <a:t>: Date parsing, categorical encoding, scaling</a:t>
-            </a:r>
-          </a:p>
-          <a:p>
-            <a:pPr marL="0" indent="0">
-              <a:buNone/>
-            </a:pPr>
-            <a:r>
-              <a:rPr lang="en-US" b="1" dirty="0"/>
-              <a:t>Feature Engineering</a:t>
-            </a:r>
-            <a:r>
-              <a:rPr lang="en-US" dirty="0"/>
-              <a:t>:</a:t>
-            </a:r>
-          </a:p>
-          <a:p>
-            <a:pPr marL="0" indent="0">
-              <a:buNone/>
-            </a:pPr>
-            <a:r>
-              <a:rPr lang="en-US" b="1" dirty="0"/>
-              <a:t>Original</a:t>
-            </a:r>
-            <a:r>
-              <a:rPr lang="en-US" dirty="0"/>
-              <a:t>: 29 features</a:t>
-            </a:r>
-          </a:p>
-          <a:p>
-            <a:pPr marL="0" indent="0">
-              <a:buNone/>
-            </a:pPr>
-            <a:r>
-              <a:rPr lang="en-US" b="1" dirty="0"/>
-              <a:t>Enhanced</a:t>
-            </a:r>
-            <a:r>
-              <a:rPr lang="en-US" dirty="0"/>
-              <a:t>: 45+ features</a:t>
-            </a:r>
-          </a:p>
-          <a:p>
-            <a:pPr marL="0" indent="0">
-              <a:buNone/>
-            </a:pPr>
-            <a:r>
-              <a:rPr lang="en-US" b="1" dirty="0"/>
-              <a:t>New Features</a:t>
-            </a:r>
-            <a:r>
-              <a:rPr lang="en-US" dirty="0"/>
-              <a:t>: Time periods, seasons, comfort index, aggregations</a:t>
+              <a:t>ML Models</a:t>
+            </a:r>
+            <a:r>
+              <a:rPr lang="en-US" dirty="0"/>
+              <a:t>: Ensemble methods, Cross-validation</a:t>
             </a:r>
           </a:p>
           <a:p>
@@ -8656,7 +8804,7 @@
     </p:spTree>
     <p:extLst>
       <p:ext uri="{BB962C8B-B14F-4D97-AF65-F5344CB8AC3E}">
-        <p14:creationId xmlns:p14="http://schemas.microsoft.com/office/powerpoint/2010/main" val="1753207368"/>
+        <p14:creationId xmlns:p14="http://schemas.microsoft.com/office/powerpoint/2010/main" val="3510047345"/>
       </p:ext>
     </p:extLst>
   </p:cSld>
@@ -8688,6 +8836,205 @@
           <p:cNvPr id="2" name="Title 1">
             <a:extLst>
               <a:ext uri="{FF2B5EF4-FFF2-40B4-BE49-F238E27FC236}">
+                <a16:creationId xmlns:a16="http://schemas.microsoft.com/office/drawing/2014/main" id="{28E189EC-3959-4215-E048-67E97DA2A996}"/>
+              </a:ext>
+            </a:extLst>
+          </p:cNvPr>
+          <p:cNvSpPr>
+            <a:spLocks noGrp="1"/>
+          </p:cNvSpPr>
+          <p:nvPr>
+            <p:ph type="title"/>
+          </p:nvPr>
+        </p:nvSpPr>
+        <p:spPr/>
+        <p:txBody>
+          <a:bodyPr/>
+          <a:lstStyle/>
+          <a:p>
+            <a:r>
+              <a:rPr lang="en-US" b="1" dirty="0">
+                <a:solidFill>
+                  <a:schemeClr val="accent2">
+                    <a:lumMod val="75000"/>
+                  </a:schemeClr>
+                </a:solidFill>
+              </a:rPr>
+              <a:t>DATA PREPROCESSING ACHIEVEMENTS</a:t>
+            </a:r>
+            <a:br>
+              <a:rPr lang="en-US" dirty="0"/>
+            </a:br>
+            <a:endParaRPr lang="en-US" dirty="0"/>
+          </a:p>
+        </p:txBody>
+      </p:sp>
+      <p:sp>
+        <p:nvSpPr>
+          <p:cNvPr id="3" name="Content Placeholder 2">
+            <a:extLst>
+              <a:ext uri="{FF2B5EF4-FFF2-40B4-BE49-F238E27FC236}">
+                <a16:creationId xmlns:a16="http://schemas.microsoft.com/office/drawing/2014/main" id="{21B7084A-CD1A-9B2E-B462-B64EE0E4F8CD}"/>
+              </a:ext>
+            </a:extLst>
+          </p:cNvPr>
+          <p:cNvSpPr>
+            <a:spLocks noGrp="1"/>
+          </p:cNvSpPr>
+          <p:nvPr>
+            <p:ph idx="1"/>
+          </p:nvPr>
+        </p:nvSpPr>
+        <p:spPr/>
+        <p:txBody>
+          <a:bodyPr>
+            <a:normAutofit/>
+          </a:bodyPr>
+          <a:lstStyle/>
+          <a:p>
+            <a:pPr marL="0" indent="0">
+              <a:buNone/>
+            </a:pPr>
+            <a:r>
+              <a:rPr lang="en-US" b="1" dirty="0"/>
+              <a:t>Data Quality Results</a:t>
+            </a:r>
+            <a:r>
+              <a:rPr lang="en-US" dirty="0"/>
+              <a:t>:</a:t>
+            </a:r>
+          </a:p>
+          <a:p>
+            <a:pPr marL="0" indent="0">
+              <a:buNone/>
+            </a:pPr>
+            <a:r>
+              <a:rPr lang="en-US" b="1" dirty="0"/>
+              <a:t>Missing Values</a:t>
+            </a:r>
+            <a:r>
+              <a:rPr lang="en-US" dirty="0"/>
+              <a:t>: 0 found (excellent data quality)</a:t>
+            </a:r>
+          </a:p>
+          <a:p>
+            <a:pPr marL="0" indent="0">
+              <a:buNone/>
+            </a:pPr>
+            <a:r>
+              <a:rPr lang="en-US" b="1" dirty="0"/>
+              <a:t>Outliers</a:t>
+            </a:r>
+            <a:r>
+              <a:rPr lang="en-US" dirty="0"/>
+              <a:t>: IQR method applied (preserved 100% of data)</a:t>
+            </a:r>
+          </a:p>
+          <a:p>
+            <a:pPr marL="0" indent="0">
+              <a:buNone/>
+            </a:pPr>
+            <a:r>
+              <a:rPr lang="en-US" b="1" dirty="0"/>
+              <a:t>Transformations</a:t>
+            </a:r>
+            <a:r>
+              <a:rPr lang="en-US" dirty="0"/>
+              <a:t>: Date parsing, categorical encoding, scaling</a:t>
+            </a:r>
+          </a:p>
+          <a:p>
+            <a:pPr marL="0" indent="0">
+              <a:buNone/>
+            </a:pPr>
+            <a:r>
+              <a:rPr lang="en-US" b="1" dirty="0"/>
+              <a:t>Feature Engineering</a:t>
+            </a:r>
+            <a:r>
+              <a:rPr lang="en-US" dirty="0"/>
+              <a:t>:</a:t>
+            </a:r>
+          </a:p>
+          <a:p>
+            <a:pPr marL="0" indent="0">
+              <a:buNone/>
+            </a:pPr>
+            <a:r>
+              <a:rPr lang="en-US" b="1" dirty="0"/>
+              <a:t>Original</a:t>
+            </a:r>
+            <a:r>
+              <a:rPr lang="en-US" dirty="0"/>
+              <a:t>: 29 features</a:t>
+            </a:r>
+          </a:p>
+          <a:p>
+            <a:pPr marL="0" indent="0">
+              <a:buNone/>
+            </a:pPr>
+            <a:r>
+              <a:rPr lang="en-US" b="1" dirty="0"/>
+              <a:t>Enhanced</a:t>
+            </a:r>
+            <a:r>
+              <a:rPr lang="en-US" dirty="0"/>
+              <a:t>: 45+ features</a:t>
+            </a:r>
+          </a:p>
+          <a:p>
+            <a:pPr marL="0" indent="0">
+              <a:buNone/>
+            </a:pPr>
+            <a:r>
+              <a:rPr lang="en-US" b="1" dirty="0"/>
+              <a:t>New Features</a:t>
+            </a:r>
+            <a:r>
+              <a:rPr lang="en-US" dirty="0"/>
+              <a:t>: Time periods, seasons, comfort index, aggregations</a:t>
+            </a:r>
+          </a:p>
+          <a:p>
+            <a:endParaRPr lang="en-US" dirty="0"/>
+          </a:p>
+        </p:txBody>
+      </p:sp>
+    </p:spTree>
+    <p:extLst>
+      <p:ext uri="{BB962C8B-B14F-4D97-AF65-F5344CB8AC3E}">
+        <p14:creationId xmlns:p14="http://schemas.microsoft.com/office/powerpoint/2010/main" val="1753207368"/>
+      </p:ext>
+    </p:extLst>
+  </p:cSld>
+  <p:clrMapOvr>
+    <a:masterClrMapping/>
+  </p:clrMapOvr>
+</p:sld>
+</file>
+
+<file path=ppt/slides/slide8.xml><?xml version="1.0" encoding="utf-8"?>
+<p:sld xmlns:a="http://schemas.openxmlformats.org/drawingml/2006/main" xmlns:r="http://schemas.openxmlformats.org/officeDocument/2006/relationships" xmlns:p="http://schemas.openxmlformats.org/presentationml/2006/main">
+  <p:cSld>
+    <p:spTree>
+      <p:nvGrpSpPr>
+        <p:cNvPr id="1" name=""/>
+        <p:cNvGrpSpPr/>
+        <p:nvPr/>
+      </p:nvGrpSpPr>
+      <p:grpSpPr>
+        <a:xfrm>
+          <a:off x="0" y="0"/>
+          <a:ext cx="0" cy="0"/>
+          <a:chOff x="0" y="0"/>
+          <a:chExt cx="0" cy="0"/>
+        </a:xfrm>
+      </p:grpSpPr>
+      <p:sp>
+        <p:nvSpPr>
+          <p:cNvPr id="2" name="Title 1">
+            <a:extLst>
+              <a:ext uri="{FF2B5EF4-FFF2-40B4-BE49-F238E27FC236}">
                 <a16:creationId xmlns:a16="http://schemas.microsoft.com/office/drawing/2014/main" id="{C60C14A5-C0CC-A935-0C97-1540BCBED34E}"/>
               </a:ext>
             </a:extLst>
@@ -8820,7 +9167,7 @@
 </p:sld>
 </file>
 
-<file path=ppt/slides/slide8.xml><?xml version="1.0" encoding="utf-8"?>
+<file path=ppt/slides/slide9.xml><?xml version="1.0" encoding="utf-8"?>
 <p:sld xmlns:a="http://schemas.openxmlformats.org/drawingml/2006/main" xmlns:r="http://schemas.openxmlformats.org/officeDocument/2006/relationships" xmlns:p="http://schemas.openxmlformats.org/presentationml/2006/main">
   <p:cSld>
     <p:spTree>
@@ -9832,218 +10179,6 @@
 </p:sld>
 </file>
 
-<file path=ppt/slides/slide9.xml><?xml version="1.0" encoding="utf-8"?>
-<p:sld xmlns:a="http://schemas.openxmlformats.org/drawingml/2006/main" xmlns:r="http://schemas.openxmlformats.org/officeDocument/2006/relationships" xmlns:p="http://schemas.openxmlformats.org/presentationml/2006/main">
-  <p:cSld>
-    <p:spTree>
-      <p:nvGrpSpPr>
-        <p:cNvPr id="1" name=""/>
-        <p:cNvGrpSpPr/>
-        <p:nvPr/>
-      </p:nvGrpSpPr>
-      <p:grpSpPr>
-        <a:xfrm>
-          <a:off x="0" y="0"/>
-          <a:ext cx="0" cy="0"/>
-          <a:chOff x="0" y="0"/>
-          <a:chExt cx="0" cy="0"/>
-        </a:xfrm>
-      </p:grpSpPr>
-      <p:sp>
-        <p:nvSpPr>
-          <p:cNvPr id="2" name="Title 1">
-            <a:extLst>
-              <a:ext uri="{FF2B5EF4-FFF2-40B4-BE49-F238E27FC236}">
-                <a16:creationId xmlns:a16="http://schemas.microsoft.com/office/drawing/2014/main" id="{CA6912A8-7B57-C527-C980-3D61A253852A}"/>
-              </a:ext>
-            </a:extLst>
-          </p:cNvPr>
-          <p:cNvSpPr>
-            <a:spLocks noGrp="1"/>
-          </p:cNvSpPr>
-          <p:nvPr>
-            <p:ph type="title"/>
-          </p:nvPr>
-        </p:nvSpPr>
-        <p:spPr/>
-        <p:txBody>
-          <a:bodyPr>
-            <a:normAutofit fontScale="90000"/>
-          </a:bodyPr>
-          <a:lstStyle/>
-          <a:p>
-            <a:br>
-              <a:rPr lang="en-US" b="1" dirty="0"/>
-            </a:br>
-            <a:r>
-              <a:rPr lang="en-US" b="1" dirty="0">
-                <a:solidFill>
-                  <a:schemeClr val="accent2">
-                    <a:lumMod val="75000"/>
-                  </a:schemeClr>
-                </a:solidFill>
-              </a:rPr>
-              <a:t>CODE STRUCTURE &amp; INNOVATION</a:t>
-            </a:r>
-            <a:br>
-              <a:rPr lang="en-US" dirty="0"/>
-            </a:br>
-            <a:br>
-              <a:rPr lang="en-US" dirty="0"/>
-            </a:br>
-            <a:endParaRPr lang="en-US" dirty="0"/>
-          </a:p>
-        </p:txBody>
-      </p:sp>
-      <p:sp>
-        <p:nvSpPr>
-          <p:cNvPr id="3" name="Content Placeholder 2">
-            <a:extLst>
-              <a:ext uri="{FF2B5EF4-FFF2-40B4-BE49-F238E27FC236}">
-                <a16:creationId xmlns:a16="http://schemas.microsoft.com/office/drawing/2014/main" id="{5394381D-C8B3-C488-523E-D665694FD461}"/>
-              </a:ext>
-            </a:extLst>
-          </p:cNvPr>
-          <p:cNvSpPr>
-            <a:spLocks noGrp="1"/>
-          </p:cNvSpPr>
-          <p:nvPr>
-            <p:ph idx="1"/>
-          </p:nvPr>
-        </p:nvSpPr>
-        <p:spPr/>
-        <p:txBody>
-          <a:bodyPr>
-            <a:normAutofit lnSpcReduction="10000"/>
-          </a:bodyPr>
-          <a:lstStyle/>
-          <a:p>
-            <a:pPr marL="0" indent="0">
-              <a:buNone/>
-            </a:pPr>
-            <a:r>
-              <a:rPr lang="en-US" b="1" dirty="0"/>
-              <a:t>Professional Code Architecture</a:t>
-            </a:r>
-            <a:r>
-              <a:rPr lang="en-US" dirty="0"/>
-              <a:t>:</a:t>
-            </a:r>
-          </a:p>
-          <a:p>
-            <a:r>
-              <a:rPr lang="en-US" b="1" dirty="0"/>
-              <a:t>50+ Modular Functions-</a:t>
-            </a:r>
-            <a:r>
-              <a:rPr lang="en-US" dirty="0"/>
-              <a:t> with comprehensive docstrings and type hints</a:t>
-            </a:r>
-          </a:p>
-          <a:p>
-            <a:r>
-              <a:rPr lang="en-US" b="1" dirty="0"/>
-              <a:t>Object-Oriented Design-</a:t>
-            </a:r>
-            <a:r>
-              <a:rPr lang="en-US" dirty="0"/>
-              <a:t> with SOLID principles implementation</a:t>
-            </a:r>
-          </a:p>
-          <a:p>
-            <a:r>
-              <a:rPr lang="en-US" b="1" dirty="0"/>
-              <a:t>Advanced Error Handling-</a:t>
-            </a:r>
-            <a:r>
-              <a:rPr lang="en-US" dirty="0"/>
-              <a:t> with professional logging framework</a:t>
-            </a:r>
-          </a:p>
-          <a:p>
-            <a:r>
-              <a:rPr lang="en-US" b="1" dirty="0"/>
-              <a:t>Research-Level Documentation-</a:t>
-            </a:r>
-            <a:r>
-              <a:rPr lang="en-US" dirty="0"/>
-              <a:t> with mathematical explanations</a:t>
-            </a:r>
-          </a:p>
-          <a:p>
-            <a:pPr marL="0" indent="0">
-              <a:buNone/>
-            </a:pPr>
-            <a:r>
-              <a:rPr lang="en-US" b="1" dirty="0"/>
-              <a:t>🚀 Innovation Features</a:t>
-            </a:r>
-            <a:r>
-              <a:rPr lang="en-US" dirty="0"/>
-              <a:t>:</a:t>
-            </a:r>
-          </a:p>
-          <a:p>
-            <a:r>
-              <a:rPr lang="en-US" b="1" dirty="0"/>
-              <a:t>6 Custom Advanced Techniques</a:t>
-            </a:r>
-            <a:r>
-              <a:rPr lang="en-US" dirty="0"/>
-              <a:t>: Novel ensemble and optimization methods</a:t>
-            </a:r>
-          </a:p>
-          <a:p>
-            <a:r>
-              <a:rPr lang="en-US" b="1" dirty="0"/>
-              <a:t>Professional Software Engineering</a:t>
-            </a:r>
-            <a:r>
-              <a:rPr lang="en-US" dirty="0"/>
-              <a:t>: Design patterns and clean architecture</a:t>
-            </a:r>
-          </a:p>
-          <a:p>
-            <a:r>
-              <a:rPr lang="en-US" b="1" dirty="0"/>
-              <a:t>Research Contributions</a:t>
-            </a:r>
-            <a:r>
-              <a:rPr lang="en-US" dirty="0"/>
-              <a:t>: Publication-worthy methodological innovations</a:t>
-            </a:r>
-          </a:p>
-          <a:p>
-            <a:r>
-              <a:rPr lang="en-US" b="1" dirty="0"/>
-              <a:t>Industry Applications</a:t>
-            </a:r>
-            <a:r>
-              <a:rPr lang="en-US" dirty="0"/>
-              <a:t>: Scalable solutions for real-world deployment</a:t>
-            </a:r>
-          </a:p>
-          <a:p>
-            <a:pPr marL="0" indent="0">
-              <a:buNone/>
-            </a:pPr>
-            <a:endParaRPr lang="en-US" dirty="0"/>
-          </a:p>
-        </p:txBody>
-      </p:sp>
-    </p:spTree>
-    <p:extLst>
-      <p:ext uri="{BB962C8B-B14F-4D97-AF65-F5344CB8AC3E}">
-        <p14:creationId xmlns:p14="http://schemas.microsoft.com/office/powerpoint/2010/main" val="919469193"/>
-      </p:ext>
-    </p:extLst>
-  </p:cSld>
-  <p:clrMapOvr>
-    <a:masterClrMapping/>
-  </p:clrMapOvr>
-</p:sld>
-</file>
-
 <file path=ppt/theme/theme1.xml><?xml version="1.0" encoding="utf-8"?>
 <a:theme xmlns:a="http://schemas.openxmlformats.org/drawingml/2006/main" name="Facet">
   <a:themeElements>

</xml_diff>